<commit_message>
Save changes in branch ShareLinkLike.
</commit_message>
<xml_diff>
--- a/SYNPHONY.pptx
+++ b/SYNPHONY.pptx
@@ -5,10 +5,10 @@
     <p:sldMasterId id="2147483648" r:id="rId4"/>
   </p:sldMasterIdLst>
   <p:notesMasterIdLst>
-    <p:notesMasterId r:id="rId14"/>
+    <p:notesMasterId r:id="rId15"/>
   </p:notesMasterIdLst>
   <p:handoutMasterIdLst>
-    <p:handoutMasterId r:id="rId15"/>
+    <p:handoutMasterId r:id="rId16"/>
   </p:handoutMasterIdLst>
   <p:sldIdLst>
     <p:sldId id="256" r:id="rId5"/>
@@ -16,10 +16,11 @@
     <p:sldId id="263" r:id="rId7"/>
     <p:sldId id="261" r:id="rId8"/>
     <p:sldId id="260" r:id="rId9"/>
-    <p:sldId id="265" r:id="rId10"/>
-    <p:sldId id="276" r:id="rId11"/>
-    <p:sldId id="278" r:id="rId12"/>
-    <p:sldId id="277" r:id="rId13"/>
+    <p:sldId id="279" r:id="rId10"/>
+    <p:sldId id="265" r:id="rId11"/>
+    <p:sldId id="276" r:id="rId12"/>
+    <p:sldId id="278" r:id="rId13"/>
+    <p:sldId id="277" r:id="rId14"/>
   </p:sldIdLst>
   <p:sldSz cx="12192000" cy="6858000"/>
   <p:notesSz cx="6858000" cy="9144000"/>
@@ -247,7 +248,7 @@
           <a:p>
             <a:fld id="{CDA3C146-E2BA-41EA-8AE9-0C67692768F2}" type="datetimeFigureOut">
               <a:rPr lang="en-US" smtClean="0"/>
-              <a:t>11/2/2019</a:t>
+              <a:t>11/3/2019</a:t>
             </a:fld>
             <a:endParaRPr lang="en-US" dirty="0"/>
           </a:p>
@@ -424,7 +425,7 @@
           <a:p>
             <a:fld id="{1F7D3EB6-8099-4744-9273-C8C1DD61A2EA}" type="datetimeFigureOut">
               <a:rPr lang="en-US" noProof="0" smtClean="0"/>
-              <a:t>11/2/2019</a:t>
+              <a:t>11/3/2019</a:t>
             </a:fld>
             <a:endParaRPr lang="en-US" noProof="0" dirty="0"/>
           </a:p>
@@ -44131,6 +44132,96 @@
 </p:sld>
 </file>
 
+<file path=ppt/slides/slide10.xml><?xml version="1.0" encoding="utf-8"?>
+<p:sld xmlns:a="http://schemas.openxmlformats.org/drawingml/2006/main" xmlns:r="http://schemas.openxmlformats.org/officeDocument/2006/relationships" xmlns:p="http://schemas.openxmlformats.org/presentationml/2006/main">
+  <p:cSld>
+    <p:spTree>
+      <p:nvGrpSpPr>
+        <p:cNvPr id="1" name=""/>
+        <p:cNvGrpSpPr/>
+        <p:nvPr/>
+      </p:nvGrpSpPr>
+      <p:grpSpPr>
+        <a:xfrm>
+          <a:off x="0" y="0"/>
+          <a:ext cx="0" cy="0"/>
+          <a:chOff x="0" y="0"/>
+          <a:chExt cx="0" cy="0"/>
+        </a:xfrm>
+      </p:grpSpPr>
+      <p:sp>
+        <p:nvSpPr>
+          <p:cNvPr id="6" name="Title 5">
+            <a:extLst>
+              <a:ext uri="{FF2B5EF4-FFF2-40B4-BE49-F238E27FC236}">
+                <a16:creationId xmlns:a16="http://schemas.microsoft.com/office/drawing/2014/main" id="{D2F9A33A-E955-4DFB-9469-3FDBA6703985}"/>
+              </a:ext>
+            </a:extLst>
+          </p:cNvPr>
+          <p:cNvSpPr>
+            <a:spLocks noGrp="1"/>
+          </p:cNvSpPr>
+          <p:nvPr>
+            <p:ph type="title"/>
+          </p:nvPr>
+        </p:nvSpPr>
+        <p:spPr/>
+        <p:txBody>
+          <a:bodyPr/>
+          <a:lstStyle/>
+          <a:p>
+            <a:r>
+              <a:rPr lang="en-US" dirty="0"/>
+              <a:t>THANK YOU!</a:t>
+            </a:r>
+            <a:endParaRPr lang="ru-RU" dirty="0"/>
+          </a:p>
+        </p:txBody>
+      </p:sp>
+      <p:pic>
+        <p:nvPicPr>
+          <p:cNvPr id="15" name="Picture Placeholder 14" descr="Abstract background">
+            <a:extLst>
+              <a:ext uri="{FF2B5EF4-FFF2-40B4-BE49-F238E27FC236}">
+                <a16:creationId xmlns:a16="http://schemas.microsoft.com/office/drawing/2014/main" id="{72AD0CC3-F8DE-4C10-916A-24BC65B1D283}"/>
+              </a:ext>
+            </a:extLst>
+          </p:cNvPr>
+          <p:cNvPicPr>
+            <a:picLocks noGrp="1" noChangeAspect="1"/>
+          </p:cNvPicPr>
+          <p:nvPr>
+            <p:ph type="pic" sz="quarter" idx="22"/>
+          </p:nvPr>
+        </p:nvPicPr>
+        <p:blipFill>
+          <a:blip r:embed="rId2">
+            <a:extLst>
+              <a:ext uri="{28A0092B-C50C-407E-A947-70E740481C1C}">
+                <a14:useLocalDpi xmlns:a14="http://schemas.microsoft.com/office/drawing/2010/main" val="0"/>
+              </a:ext>
+            </a:extLst>
+          </a:blip>
+          <a:srcRect/>
+          <a:stretch>
+            <a:fillRect/>
+          </a:stretch>
+        </p:blipFill>
+        <p:spPr/>
+      </p:pic>
+    </p:spTree>
+    <p:extLst>
+      <p:ext uri="{BB962C8B-B14F-4D97-AF65-F5344CB8AC3E}">
+        <p14:creationId xmlns:p14="http://schemas.microsoft.com/office/powerpoint/2010/main" val="2695672276"/>
+      </p:ext>
+    </p:extLst>
+  </p:cSld>
+  <p:clrMapOvr>
+    <a:masterClrMapping/>
+  </p:clrMapOvr>
+</p:sld>
+</file>
+
 <file path=ppt/slides/slide2.xml><?xml version="1.0" encoding="utf-8"?>
 <p:sld xmlns:a="http://schemas.openxmlformats.org/drawingml/2006/main" xmlns:r="http://schemas.openxmlformats.org/officeDocument/2006/relationships" xmlns:p="http://schemas.openxmlformats.org/presentationml/2006/main">
   <p:cSld>
@@ -44227,18 +44318,30 @@
           </a:bodyPr>
           <a:lstStyle/>
           <a:p>
+            <a:pPr marL="285750" indent="-285750">
+              <a:buFont typeface="Arial" panose="020B0604020202020204" pitchFamily="34" charset="0"/>
+              <a:buChar char="•"/>
+            </a:pPr>
             <a:r>
               <a:rPr lang="en-US" dirty="0"/>
               <a:t>SHARE CURRENT MUSIC WITH OTHERS</a:t>
             </a:r>
           </a:p>
           <a:p>
+            <a:pPr marL="285750" indent="-285750">
+              <a:buFont typeface="Arial" panose="020B0604020202020204" pitchFamily="34" charset="0"/>
+              <a:buChar char="•"/>
+            </a:pPr>
             <a:r>
               <a:rPr lang="en-US" dirty="0"/>
               <a:t>LISTEN TO THE SYNCRONIZED MUSIC</a:t>
             </a:r>
           </a:p>
           <a:p>
+            <a:pPr marL="285750" indent="-285750">
+              <a:buFont typeface="Arial" panose="020B0604020202020204" pitchFamily="34" charset="0"/>
+              <a:buChar char="•"/>
+            </a:pPr>
             <a:r>
               <a:rPr lang="en-US" dirty="0"/>
               <a:t>LIKE THE SONG AND CHAT</a:t>
@@ -44363,40 +44466,6 @@
           <a:chExt cx="0" cy="0"/>
         </a:xfrm>
       </p:grpSpPr>
-      <p:pic>
-        <p:nvPicPr>
-          <p:cNvPr id="17" name="Picture Placeholder 16" descr="Company logo">
-            <a:extLst>
-              <a:ext uri="{FF2B5EF4-FFF2-40B4-BE49-F238E27FC236}">
-                <a16:creationId xmlns:a16="http://schemas.microsoft.com/office/drawing/2014/main" id="{D652F905-B33B-4D47-80C8-0F74935D9B8E}"/>
-              </a:ext>
-            </a:extLst>
-          </p:cNvPr>
-          <p:cNvPicPr>
-            <a:picLocks noGrp="1" noChangeAspect="1"/>
-          </p:cNvPicPr>
-          <p:nvPr>
-            <p:ph type="pic" sz="quarter" idx="13"/>
-          </p:nvPr>
-        </p:nvPicPr>
-        <p:blipFill>
-          <a:blip r:embed="rId2">
-            <a:extLst>
-              <a:ext uri="{28A0092B-C50C-407E-A947-70E740481C1C}">
-                <a14:useLocalDpi xmlns:a14="http://schemas.microsoft.com/office/drawing/2010/main" val="0"/>
-              </a:ext>
-              <a:ext uri="{96DAC541-7B7A-43D3-8B79-37D633B846F1}">
-                <asvg:svgBlip xmlns:asvg="http://schemas.microsoft.com/office/drawing/2016/SVG/main" r:embed="rId3"/>
-              </a:ext>
-            </a:extLst>
-          </a:blip>
-          <a:srcRect/>
-          <a:stretch>
-            <a:fillRect/>
-          </a:stretch>
-        </p:blipFill>
-        <p:spPr/>
-      </p:pic>
       <p:sp>
         <p:nvSpPr>
           <p:cNvPr id="5" name="Title 4">
@@ -44421,34 +44490,6 @@
             <a:r>
               <a:rPr lang="en-US" dirty="0"/>
               <a:t>ORIGINAL GOALS</a:t>
-            </a:r>
-          </a:p>
-        </p:txBody>
-      </p:sp>
-      <p:sp>
-        <p:nvSpPr>
-          <p:cNvPr id="6" name="Text Placeholder 5">
-            <a:extLst>
-              <a:ext uri="{FF2B5EF4-FFF2-40B4-BE49-F238E27FC236}">
-                <a16:creationId xmlns:a16="http://schemas.microsoft.com/office/drawing/2014/main" id="{04CE41FD-E209-4A5A-A2E8-544E35CFA6C5}"/>
-              </a:ext>
-            </a:extLst>
-          </p:cNvPr>
-          <p:cNvSpPr>
-            <a:spLocks noGrp="1"/>
-          </p:cNvSpPr>
-          <p:nvPr>
-            <p:ph type="body" idx="1"/>
-          </p:nvPr>
-        </p:nvSpPr>
-        <p:spPr/>
-        <p:txBody>
-          <a:bodyPr/>
-          <a:lstStyle/>
-          <a:p>
-            <a:r>
-              <a:rPr lang="en-US" dirty="0"/>
-              <a:t>LOREM IPSUM DOLOR SIT AMET, CONSECTETUER ADIPISCING ELIT. MAECENAS PORTTITOR</a:t>
             </a:r>
           </a:p>
         </p:txBody>
@@ -44859,40 +44900,6 @@
           <a:chExt cx="0" cy="0"/>
         </a:xfrm>
       </p:grpSpPr>
-      <p:pic>
-        <p:nvPicPr>
-          <p:cNvPr id="6" name="Picture Placeholder 5" descr="Company logo">
-            <a:extLst>
-              <a:ext uri="{FF2B5EF4-FFF2-40B4-BE49-F238E27FC236}">
-                <a16:creationId xmlns:a16="http://schemas.microsoft.com/office/drawing/2014/main" id="{050063B3-C0D3-4BFD-82C5-423222881E49}"/>
-              </a:ext>
-            </a:extLst>
-          </p:cNvPr>
-          <p:cNvPicPr>
-            <a:picLocks noGrp="1" noChangeAspect="1"/>
-          </p:cNvPicPr>
-          <p:nvPr>
-            <p:ph type="pic" sz="quarter" idx="13"/>
-          </p:nvPr>
-        </p:nvPicPr>
-        <p:blipFill>
-          <a:blip r:embed="rId2">
-            <a:extLst>
-              <a:ext uri="{28A0092B-C50C-407E-A947-70E740481C1C}">
-                <a14:useLocalDpi xmlns:a14="http://schemas.microsoft.com/office/drawing/2010/main" val="0"/>
-              </a:ext>
-              <a:ext uri="{96DAC541-7B7A-43D3-8B79-37D633B846F1}">
-                <asvg:svgBlip xmlns:asvg="http://schemas.microsoft.com/office/drawing/2016/SVG/main" r:embed="rId3"/>
-              </a:ext>
-            </a:extLst>
-          </a:blip>
-          <a:srcRect/>
-          <a:stretch>
-            <a:fillRect/>
-          </a:stretch>
-        </p:blipFill>
-        <p:spPr/>
-      </p:pic>
       <p:sp>
         <p:nvSpPr>
           <p:cNvPr id="67" name="Title 66">
@@ -44949,7 +44956,10 @@
           <a:bodyPr/>
           <a:lstStyle/>
           <a:p>
-            <a:endParaRPr lang="en-US" dirty="0"/>
+            <a:r>
+              <a:rPr lang="en-US" dirty="0"/>
+              <a:t>Main functions</a:t>
+            </a:r>
           </a:p>
         </p:txBody>
       </p:sp>
@@ -44969,7 +44979,12 @@
             <p:ph type="body" idx="16"/>
           </p:nvPr>
         </p:nvSpPr>
-        <p:spPr/>
+        <p:spPr>
+          <a:xfrm>
+            <a:off x="858483" y="3345106"/>
+            <a:ext cx="1209357" cy="640080"/>
+          </a:xfrm>
+        </p:spPr>
         <p:txBody>
           <a:bodyPr/>
           <a:lstStyle/>
@@ -44998,13 +45013,13 @@
           </p:nvPr>
         </p:nvPicPr>
         <p:blipFill>
-          <a:blip r:embed="rId4">
+          <a:blip r:embed="rId2">
             <a:extLst>
               <a:ext uri="{28A0092B-C50C-407E-A947-70E740481C1C}">
                 <a14:useLocalDpi xmlns:a14="http://schemas.microsoft.com/office/drawing/2010/main" val="0"/>
               </a:ext>
               <a:ext uri="{96DAC541-7B7A-43D3-8B79-37D633B846F1}">
-                <asvg:svgBlip xmlns:asvg="http://schemas.microsoft.com/office/drawing/2016/SVG/main" r:embed="rId5"/>
+                <asvg:svgBlip xmlns:asvg="http://schemas.microsoft.com/office/drawing/2016/SVG/main" r:embed="rId3"/>
               </a:ext>
             </a:extLst>
           </a:blip>
@@ -45013,7 +45028,12 @@
             <a:fillRect/>
           </a:stretch>
         </p:blipFill>
-        <p:spPr/>
+        <p:spPr>
+          <a:xfrm>
+            <a:off x="2117093" y="3326818"/>
+            <a:ext cx="640080" cy="658368"/>
+          </a:xfrm>
+        </p:spPr>
       </p:pic>
       <p:sp>
         <p:nvSpPr>
@@ -45031,7 +45051,12 @@
             <p:ph type="body" idx="14"/>
           </p:nvPr>
         </p:nvSpPr>
-        <p:spPr/>
+        <p:spPr>
+          <a:xfrm>
+            <a:off x="2947102" y="3345106"/>
+            <a:ext cx="2670048" cy="640080"/>
+          </a:xfrm>
+        </p:spPr>
         <p:txBody>
           <a:bodyPr/>
           <a:lstStyle/>
@@ -45062,21 +45087,19 @@
             <p:ph type="body" idx="22"/>
           </p:nvPr>
         </p:nvSpPr>
-        <p:spPr/>
+        <p:spPr>
+          <a:xfrm>
+            <a:off x="6487440" y="3345106"/>
+            <a:ext cx="1209357" cy="640080"/>
+          </a:xfrm>
+        </p:spPr>
         <p:txBody>
           <a:bodyPr/>
           <a:lstStyle/>
           <a:p>
             <a:r>
               <a:rPr lang="en-US" dirty="0"/>
-              <a:t>Section 2</a:t>
-            </a:r>
-            <a:br>
-              <a:rPr lang="en-US" dirty="0"/>
-            </a:br>
-            <a:r>
-              <a:rPr lang="en-US" dirty="0"/>
-              <a:t>Title</a:t>
+              <a:t>Sharable Link</a:t>
             </a:r>
           </a:p>
         </p:txBody>
@@ -45098,13 +45121,13 @@
           </p:nvPr>
         </p:nvPicPr>
         <p:blipFill>
-          <a:blip r:embed="rId6">
+          <a:blip r:embed="rId4">
             <a:extLst>
               <a:ext uri="{28A0092B-C50C-407E-A947-70E740481C1C}">
                 <a14:useLocalDpi xmlns:a14="http://schemas.microsoft.com/office/drawing/2010/main" val="0"/>
               </a:ext>
               <a:ext uri="{96DAC541-7B7A-43D3-8B79-37D633B846F1}">
-                <asvg:svgBlip xmlns:asvg="http://schemas.microsoft.com/office/drawing/2016/SVG/main" r:embed="rId7"/>
+                <asvg:svgBlip xmlns:asvg="http://schemas.microsoft.com/office/drawing/2016/SVG/main" r:embed="rId5"/>
               </a:ext>
             </a:extLst>
           </a:blip>
@@ -45113,7 +45136,12 @@
             <a:fillRect/>
           </a:stretch>
         </p:blipFill>
-        <p:spPr/>
+        <p:spPr>
+          <a:xfrm>
+            <a:off x="7746050" y="3326818"/>
+            <a:ext cx="640080" cy="658368"/>
+          </a:xfrm>
+        </p:spPr>
       </p:pic>
       <p:sp>
         <p:nvSpPr>
@@ -45131,14 +45159,25 @@
             <p:ph type="body" idx="20"/>
           </p:nvPr>
         </p:nvSpPr>
-        <p:spPr/>
+        <p:spPr>
+          <a:xfrm>
+            <a:off x="8576059" y="3345106"/>
+            <a:ext cx="2670048" cy="640080"/>
+          </a:xfrm>
+        </p:spPr>
         <p:txBody>
           <a:bodyPr/>
           <a:lstStyle/>
           <a:p>
             <a:r>
               <a:rPr lang="en-US" dirty="0"/>
-              <a:t>Lorem ipsum dolor sit amet, consectetuer adipiscing elit. Maecenas porttitor congue</a:t>
+              <a:t>Hash function,</a:t>
+            </a:r>
+          </a:p>
+          <a:p>
+            <a:r>
+              <a:rPr lang="en-US" dirty="0"/>
+              <a:t>Randomly generate a link</a:t>
             </a:r>
           </a:p>
         </p:txBody>
@@ -45159,7 +45198,12 @@
             <p:ph type="body" idx="19"/>
           </p:nvPr>
         </p:nvSpPr>
-        <p:spPr/>
+        <p:spPr>
+          <a:xfrm>
+            <a:off x="858483" y="4480874"/>
+            <a:ext cx="1209357" cy="640080"/>
+          </a:xfrm>
+        </p:spPr>
         <p:txBody>
           <a:bodyPr/>
           <a:lstStyle/>
@@ -45188,13 +45232,13 @@
           </p:nvPr>
         </p:nvPicPr>
         <p:blipFill>
-          <a:blip r:embed="rId8">
+          <a:blip r:embed="rId6">
             <a:extLst>
               <a:ext uri="{28A0092B-C50C-407E-A947-70E740481C1C}">
                 <a14:useLocalDpi xmlns:a14="http://schemas.microsoft.com/office/drawing/2010/main" val="0"/>
               </a:ext>
               <a:ext uri="{96DAC541-7B7A-43D3-8B79-37D633B846F1}">
-                <asvg:svgBlip xmlns:asvg="http://schemas.microsoft.com/office/drawing/2016/SVG/main" r:embed="rId9"/>
+                <asvg:svgBlip xmlns:asvg="http://schemas.microsoft.com/office/drawing/2016/SVG/main" r:embed="rId7"/>
               </a:ext>
             </a:extLst>
           </a:blip>
@@ -45203,7 +45247,12 @@
             <a:fillRect/>
           </a:stretch>
         </p:blipFill>
-        <p:spPr/>
+        <p:spPr>
+          <a:xfrm>
+            <a:off x="2117093" y="4462586"/>
+            <a:ext cx="640080" cy="658368"/>
+          </a:xfrm>
+        </p:spPr>
       </p:pic>
       <p:sp>
         <p:nvSpPr>
@@ -45221,7 +45270,12 @@
             <p:ph type="body" idx="17"/>
           </p:nvPr>
         </p:nvSpPr>
-        <p:spPr/>
+        <p:spPr>
+          <a:xfrm>
+            <a:off x="2947102" y="4480874"/>
+            <a:ext cx="2670048" cy="640080"/>
+          </a:xfrm>
+        </p:spPr>
         <p:txBody>
           <a:bodyPr/>
           <a:lstStyle/>
@@ -45230,6 +45284,15 @@
               <a:rPr lang="en-US" dirty="0"/>
               <a:t>AJAX</a:t>
             </a:r>
+            <a:r>
+              <a:rPr lang="zh-CN" altLang="en-US" dirty="0"/>
+              <a:t>， </a:t>
+            </a:r>
+            <a:r>
+              <a:rPr lang="en-US" altLang="zh-CN" dirty="0" err="1"/>
+              <a:t>Javascript</a:t>
+            </a:r>
+            <a:endParaRPr lang="en-US" dirty="0"/>
           </a:p>
         </p:txBody>
       </p:sp>
@@ -45249,21 +45312,19 @@
             <p:ph type="body" idx="25"/>
           </p:nvPr>
         </p:nvSpPr>
-        <p:spPr/>
+        <p:spPr>
+          <a:xfrm>
+            <a:off x="6487440" y="4480874"/>
+            <a:ext cx="1209357" cy="640080"/>
+          </a:xfrm>
+        </p:spPr>
         <p:txBody>
           <a:bodyPr/>
           <a:lstStyle/>
           <a:p>
             <a:r>
               <a:rPr lang="en-US" dirty="0"/>
-              <a:t>Section 4</a:t>
-            </a:r>
-            <a:br>
-              <a:rPr lang="en-US" dirty="0"/>
-            </a:br>
-            <a:r>
-              <a:rPr lang="en-US" dirty="0"/>
-              <a:t>Title</a:t>
+              <a:t>Like the Song</a:t>
             </a:r>
           </a:p>
         </p:txBody>
@@ -45285,13 +45346,13 @@
           </p:nvPr>
         </p:nvPicPr>
         <p:blipFill>
-          <a:blip r:embed="rId10">
+          <a:blip r:embed="rId8">
             <a:extLst>
               <a:ext uri="{28A0092B-C50C-407E-A947-70E740481C1C}">
                 <a14:useLocalDpi xmlns:a14="http://schemas.microsoft.com/office/drawing/2010/main" val="0"/>
               </a:ext>
               <a:ext uri="{96DAC541-7B7A-43D3-8B79-37D633B846F1}">
-                <asvg:svgBlip xmlns:asvg="http://schemas.microsoft.com/office/drawing/2016/SVG/main" r:embed="rId11"/>
+                <asvg:svgBlip xmlns:asvg="http://schemas.microsoft.com/office/drawing/2016/SVG/main" r:embed="rId9"/>
               </a:ext>
             </a:extLst>
           </a:blip>
@@ -45300,7 +45361,12 @@
             <a:fillRect/>
           </a:stretch>
         </p:blipFill>
-        <p:spPr/>
+        <p:spPr>
+          <a:xfrm>
+            <a:off x="7746050" y="4462586"/>
+            <a:ext cx="640080" cy="658368"/>
+          </a:xfrm>
+        </p:spPr>
       </p:pic>
       <p:sp>
         <p:nvSpPr>
@@ -45318,15 +45384,25 @@
             <p:ph type="body" idx="23"/>
           </p:nvPr>
         </p:nvSpPr>
-        <p:spPr/>
+        <p:spPr>
+          <a:xfrm>
+            <a:off x="8576059" y="4480874"/>
+            <a:ext cx="2670048" cy="640080"/>
+          </a:xfrm>
+        </p:spPr>
         <p:txBody>
           <a:bodyPr/>
           <a:lstStyle/>
           <a:p>
             <a:r>
               <a:rPr lang="en-US" dirty="0"/>
-              <a:t>Lorem ipsum dolor sit amet, consectetuer adipiscing elit. Maecenas porttitor congue</a:t>
+              <a:t>Django, </a:t>
             </a:r>
+            <a:r>
+              <a:rPr lang="en-US" dirty="0" err="1"/>
+              <a:t>sqlite</a:t>
+            </a:r>
+            <a:endParaRPr lang="en-US" dirty="0"/>
           </a:p>
         </p:txBody>
       </p:sp>
@@ -45385,6 +45461,961 @@
               <a:rPr lang="en-US" dirty="0"/>
               <a:t>MM.DD.20XX</a:t>
             </a:r>
+          </a:p>
+        </p:txBody>
+      </p:sp>
+      <p:sp>
+        <p:nvSpPr>
+          <p:cNvPr id="20" name="Text Placeholder 15">
+            <a:extLst>
+              <a:ext uri="{FF2B5EF4-FFF2-40B4-BE49-F238E27FC236}">
+                <a16:creationId xmlns:a16="http://schemas.microsoft.com/office/drawing/2014/main" id="{315DE155-E40E-4A9C-B370-85A0897F4006}"/>
+              </a:ext>
+            </a:extLst>
+          </p:cNvPr>
+          <p:cNvSpPr txBox="1">
+            <a:spLocks/>
+          </p:cNvSpPr>
+          <p:nvPr/>
+        </p:nvSpPr>
+        <p:spPr>
+          <a:xfrm>
+            <a:off x="778643" y="974584"/>
+            <a:ext cx="1209357" cy="640080"/>
+          </a:xfrm>
+          <a:prstGeom prst="rect">
+            <a:avLst/>
+          </a:prstGeom>
+        </p:spPr>
+        <p:txBody>
+          <a:bodyPr vert="horz" lIns="0" tIns="0" rIns="0" bIns="0" rtlCol="0">
+            <a:normAutofit/>
+          </a:bodyPr>
+          <a:lstStyle>
+            <a:lvl1pPr marL="0" indent="0" algn="l" defTabSz="914400" rtl="0" eaLnBrk="1" latinLnBrk="0" hangingPunct="1">
+              <a:lnSpc>
+                <a:spcPct val="90000"/>
+              </a:lnSpc>
+              <a:spcBef>
+                <a:spcPts val="600"/>
+              </a:spcBef>
+              <a:buClr>
+                <a:schemeClr val="tx1"/>
+              </a:buClr>
+              <a:buFont typeface="Courier New" panose="02070309020205020404" pitchFamily="49" charset="0"/>
+              <a:buNone/>
+              <a:defRPr sz="2000" b="1" kern="1200">
+                <a:solidFill>
+                  <a:schemeClr val="bg2"/>
+                </a:solidFill>
+                <a:latin typeface="+mj-lt"/>
+                <a:ea typeface="+mn-ea"/>
+                <a:cs typeface="+mn-cs"/>
+              </a:defRPr>
+            </a:lvl1pPr>
+            <a:lvl2pPr marL="457200" indent="0" algn="l" defTabSz="914400" rtl="0" eaLnBrk="1" latinLnBrk="0" hangingPunct="1">
+              <a:lnSpc>
+                <a:spcPct val="90000"/>
+              </a:lnSpc>
+              <a:spcBef>
+                <a:spcPts val="500"/>
+              </a:spcBef>
+              <a:buFont typeface="Arial" panose="020B0604020202020204" pitchFamily="34" charset="0"/>
+              <a:buNone/>
+              <a:defRPr sz="2000" kern="1200">
+                <a:solidFill>
+                  <a:schemeClr val="tx1">
+                    <a:tint val="75000"/>
+                  </a:schemeClr>
+                </a:solidFill>
+                <a:latin typeface="+mn-lt"/>
+                <a:ea typeface="+mn-ea"/>
+                <a:cs typeface="+mn-cs"/>
+              </a:defRPr>
+            </a:lvl2pPr>
+            <a:lvl3pPr marL="914400" indent="0" algn="l" defTabSz="914400" rtl="0" eaLnBrk="1" latinLnBrk="0" hangingPunct="1">
+              <a:lnSpc>
+                <a:spcPct val="90000"/>
+              </a:lnSpc>
+              <a:spcBef>
+                <a:spcPts val="500"/>
+              </a:spcBef>
+              <a:buFont typeface="Arial" panose="020B0604020202020204" pitchFamily="34" charset="0"/>
+              <a:buNone/>
+              <a:defRPr sz="1800" kern="1200">
+                <a:solidFill>
+                  <a:schemeClr val="tx1">
+                    <a:tint val="75000"/>
+                  </a:schemeClr>
+                </a:solidFill>
+                <a:latin typeface="+mn-lt"/>
+                <a:ea typeface="+mn-ea"/>
+                <a:cs typeface="+mn-cs"/>
+              </a:defRPr>
+            </a:lvl3pPr>
+            <a:lvl4pPr marL="1371600" indent="0" algn="l" defTabSz="914400" rtl="0" eaLnBrk="1" latinLnBrk="0" hangingPunct="1">
+              <a:lnSpc>
+                <a:spcPct val="90000"/>
+              </a:lnSpc>
+              <a:spcBef>
+                <a:spcPts val="500"/>
+              </a:spcBef>
+              <a:buFont typeface="Arial" panose="020B0604020202020204" pitchFamily="34" charset="0"/>
+              <a:buNone/>
+              <a:defRPr sz="1600" kern="1200">
+                <a:solidFill>
+                  <a:schemeClr val="tx1">
+                    <a:tint val="75000"/>
+                  </a:schemeClr>
+                </a:solidFill>
+                <a:latin typeface="+mn-lt"/>
+                <a:ea typeface="+mn-ea"/>
+                <a:cs typeface="+mn-cs"/>
+              </a:defRPr>
+            </a:lvl4pPr>
+            <a:lvl5pPr marL="1828800" indent="0" algn="l" defTabSz="914400" rtl="0" eaLnBrk="1" latinLnBrk="0" hangingPunct="1">
+              <a:lnSpc>
+                <a:spcPct val="90000"/>
+              </a:lnSpc>
+              <a:spcBef>
+                <a:spcPts val="500"/>
+              </a:spcBef>
+              <a:buFont typeface="Arial" panose="020B0604020202020204" pitchFamily="34" charset="0"/>
+              <a:buNone/>
+              <a:defRPr sz="1600" kern="1200">
+                <a:solidFill>
+                  <a:schemeClr val="tx1">
+                    <a:tint val="75000"/>
+                  </a:schemeClr>
+                </a:solidFill>
+                <a:latin typeface="+mn-lt"/>
+                <a:ea typeface="+mn-ea"/>
+                <a:cs typeface="+mn-cs"/>
+              </a:defRPr>
+            </a:lvl5pPr>
+            <a:lvl6pPr marL="2286000" indent="0" algn="l" defTabSz="914400" rtl="0" eaLnBrk="1" latinLnBrk="0" hangingPunct="1">
+              <a:lnSpc>
+                <a:spcPct val="90000"/>
+              </a:lnSpc>
+              <a:spcBef>
+                <a:spcPts val="500"/>
+              </a:spcBef>
+              <a:buFont typeface="Arial" panose="020B0604020202020204" pitchFamily="34" charset="0"/>
+              <a:buNone/>
+              <a:defRPr sz="1600" kern="1200">
+                <a:solidFill>
+                  <a:schemeClr val="tx1">
+                    <a:tint val="75000"/>
+                  </a:schemeClr>
+                </a:solidFill>
+                <a:latin typeface="+mn-lt"/>
+                <a:ea typeface="+mn-ea"/>
+                <a:cs typeface="+mn-cs"/>
+              </a:defRPr>
+            </a:lvl6pPr>
+            <a:lvl7pPr marL="2743200" indent="0" algn="l" defTabSz="914400" rtl="0" eaLnBrk="1" latinLnBrk="0" hangingPunct="1">
+              <a:lnSpc>
+                <a:spcPct val="90000"/>
+              </a:lnSpc>
+              <a:spcBef>
+                <a:spcPts val="500"/>
+              </a:spcBef>
+              <a:buFont typeface="Arial" panose="020B0604020202020204" pitchFamily="34" charset="0"/>
+              <a:buNone/>
+              <a:defRPr sz="1600" kern="1200">
+                <a:solidFill>
+                  <a:schemeClr val="tx1">
+                    <a:tint val="75000"/>
+                  </a:schemeClr>
+                </a:solidFill>
+                <a:latin typeface="+mn-lt"/>
+                <a:ea typeface="+mn-ea"/>
+                <a:cs typeface="+mn-cs"/>
+              </a:defRPr>
+            </a:lvl7pPr>
+            <a:lvl8pPr marL="3200400" indent="0" algn="l" defTabSz="914400" rtl="0" eaLnBrk="1" latinLnBrk="0" hangingPunct="1">
+              <a:lnSpc>
+                <a:spcPct val="90000"/>
+              </a:lnSpc>
+              <a:spcBef>
+                <a:spcPts val="500"/>
+              </a:spcBef>
+              <a:buFont typeface="Arial" panose="020B0604020202020204" pitchFamily="34" charset="0"/>
+              <a:buNone/>
+              <a:defRPr sz="1600" kern="1200">
+                <a:solidFill>
+                  <a:schemeClr val="tx1">
+                    <a:tint val="75000"/>
+                  </a:schemeClr>
+                </a:solidFill>
+                <a:latin typeface="+mn-lt"/>
+                <a:ea typeface="+mn-ea"/>
+                <a:cs typeface="+mn-cs"/>
+              </a:defRPr>
+            </a:lvl8pPr>
+            <a:lvl9pPr marL="3657600" indent="0" algn="l" defTabSz="914400" rtl="0" eaLnBrk="1" latinLnBrk="0" hangingPunct="1">
+              <a:lnSpc>
+                <a:spcPct val="90000"/>
+              </a:lnSpc>
+              <a:spcBef>
+                <a:spcPts val="500"/>
+              </a:spcBef>
+              <a:buFont typeface="Arial" panose="020B0604020202020204" pitchFamily="34" charset="0"/>
+              <a:buNone/>
+              <a:defRPr sz="1600" kern="1200">
+                <a:solidFill>
+                  <a:schemeClr val="tx1">
+                    <a:tint val="75000"/>
+                  </a:schemeClr>
+                </a:solidFill>
+                <a:latin typeface="+mn-lt"/>
+                <a:ea typeface="+mn-ea"/>
+                <a:cs typeface="+mn-cs"/>
+              </a:defRPr>
+            </a:lvl9pPr>
+          </a:lstStyle>
+          <a:p>
+            <a:r>
+              <a:rPr lang="en-US" altLang="zh-CN" dirty="0"/>
+              <a:t>Log In</a:t>
+            </a:r>
+            <a:endParaRPr lang="en-US" dirty="0"/>
+          </a:p>
+        </p:txBody>
+      </p:sp>
+      <p:pic>
+        <p:nvPicPr>
+          <p:cNvPr id="22" name="Picture Placeholder 11" descr="Cubes icon">
+            <a:extLst>
+              <a:ext uri="{FF2B5EF4-FFF2-40B4-BE49-F238E27FC236}">
+                <a16:creationId xmlns:a16="http://schemas.microsoft.com/office/drawing/2014/main" id="{417C88CA-CAFA-4802-BEAF-0A5306928809}"/>
+              </a:ext>
+            </a:extLst>
+          </p:cNvPr>
+          <p:cNvPicPr>
+            <a:picLocks noChangeAspect="1"/>
+          </p:cNvPicPr>
+          <p:nvPr/>
+        </p:nvPicPr>
+        <p:blipFill>
+          <a:blip r:embed="rId4">
+            <a:extLst>
+              <a:ext uri="{28A0092B-C50C-407E-A947-70E740481C1C}">
+                <a14:useLocalDpi xmlns:a14="http://schemas.microsoft.com/office/drawing/2010/main" val="0"/>
+              </a:ext>
+              <a:ext uri="{96DAC541-7B7A-43D3-8B79-37D633B846F1}">
+                <asvg:svgBlip xmlns:asvg="http://schemas.microsoft.com/office/drawing/2016/SVG/main" r:embed="rId5"/>
+              </a:ext>
+            </a:extLst>
+          </a:blip>
+          <a:srcRect l="1446" r="1446"/>
+          <a:stretch>
+            <a:fillRect/>
+          </a:stretch>
+        </p:blipFill>
+        <p:spPr>
+          <a:xfrm>
+            <a:off x="2037253" y="956296"/>
+            <a:ext cx="640080" cy="658368"/>
+          </a:xfrm>
+          <a:prstGeom prst="rect">
+            <a:avLst/>
+          </a:prstGeom>
+        </p:spPr>
+      </p:pic>
+      <p:sp>
+        <p:nvSpPr>
+          <p:cNvPr id="23" name="Text Placeholder 13">
+            <a:extLst>
+              <a:ext uri="{FF2B5EF4-FFF2-40B4-BE49-F238E27FC236}">
+                <a16:creationId xmlns:a16="http://schemas.microsoft.com/office/drawing/2014/main" id="{DAB80A50-673B-41A3-B4BF-AB5B5CA7F96E}"/>
+              </a:ext>
+            </a:extLst>
+          </p:cNvPr>
+          <p:cNvSpPr txBox="1">
+            <a:spLocks/>
+          </p:cNvSpPr>
+          <p:nvPr/>
+        </p:nvSpPr>
+        <p:spPr>
+          <a:xfrm>
+            <a:off x="2867262" y="974584"/>
+            <a:ext cx="2670048" cy="640080"/>
+          </a:xfrm>
+          <a:prstGeom prst="rect">
+            <a:avLst/>
+          </a:prstGeom>
+        </p:spPr>
+        <p:txBody>
+          <a:bodyPr vert="horz" lIns="0" tIns="0" rIns="0" bIns="0" rtlCol="0">
+            <a:normAutofit/>
+          </a:bodyPr>
+          <a:lstStyle>
+            <a:lvl1pPr marL="0" indent="0" algn="l" defTabSz="914400" rtl="0" eaLnBrk="1" latinLnBrk="0" hangingPunct="1">
+              <a:lnSpc>
+                <a:spcPct val="100000"/>
+              </a:lnSpc>
+              <a:spcBef>
+                <a:spcPts val="600"/>
+              </a:spcBef>
+              <a:buClr>
+                <a:schemeClr val="tx1"/>
+              </a:buClr>
+              <a:buFont typeface="Courier New" panose="02070309020205020404" pitchFamily="49" charset="0"/>
+              <a:buNone/>
+              <a:defRPr sz="1400" kern="1200">
+                <a:solidFill>
+                  <a:schemeClr val="tx2"/>
+                </a:solidFill>
+                <a:latin typeface="+mn-lt"/>
+                <a:ea typeface="+mn-ea"/>
+                <a:cs typeface="+mn-cs"/>
+              </a:defRPr>
+            </a:lvl1pPr>
+            <a:lvl2pPr marL="457200" indent="0" algn="l" defTabSz="914400" rtl="0" eaLnBrk="1" latinLnBrk="0" hangingPunct="1">
+              <a:lnSpc>
+                <a:spcPct val="90000"/>
+              </a:lnSpc>
+              <a:spcBef>
+                <a:spcPts val="500"/>
+              </a:spcBef>
+              <a:buFont typeface="Arial" panose="020B0604020202020204" pitchFamily="34" charset="0"/>
+              <a:buNone/>
+              <a:defRPr sz="2000" kern="1200">
+                <a:solidFill>
+                  <a:schemeClr val="tx1">
+                    <a:tint val="75000"/>
+                  </a:schemeClr>
+                </a:solidFill>
+                <a:latin typeface="+mn-lt"/>
+                <a:ea typeface="+mn-ea"/>
+                <a:cs typeface="+mn-cs"/>
+              </a:defRPr>
+            </a:lvl2pPr>
+            <a:lvl3pPr marL="914400" indent="0" algn="l" defTabSz="914400" rtl="0" eaLnBrk="1" latinLnBrk="0" hangingPunct="1">
+              <a:lnSpc>
+                <a:spcPct val="90000"/>
+              </a:lnSpc>
+              <a:spcBef>
+                <a:spcPts val="500"/>
+              </a:spcBef>
+              <a:buFont typeface="Arial" panose="020B0604020202020204" pitchFamily="34" charset="0"/>
+              <a:buNone/>
+              <a:defRPr sz="1800" kern="1200">
+                <a:solidFill>
+                  <a:schemeClr val="tx1">
+                    <a:tint val="75000"/>
+                  </a:schemeClr>
+                </a:solidFill>
+                <a:latin typeface="+mn-lt"/>
+                <a:ea typeface="+mn-ea"/>
+                <a:cs typeface="+mn-cs"/>
+              </a:defRPr>
+            </a:lvl3pPr>
+            <a:lvl4pPr marL="1371600" indent="0" algn="l" defTabSz="914400" rtl="0" eaLnBrk="1" latinLnBrk="0" hangingPunct="1">
+              <a:lnSpc>
+                <a:spcPct val="90000"/>
+              </a:lnSpc>
+              <a:spcBef>
+                <a:spcPts val="500"/>
+              </a:spcBef>
+              <a:buFont typeface="Arial" panose="020B0604020202020204" pitchFamily="34" charset="0"/>
+              <a:buNone/>
+              <a:defRPr sz="1600" kern="1200">
+                <a:solidFill>
+                  <a:schemeClr val="tx1">
+                    <a:tint val="75000"/>
+                  </a:schemeClr>
+                </a:solidFill>
+                <a:latin typeface="+mn-lt"/>
+                <a:ea typeface="+mn-ea"/>
+                <a:cs typeface="+mn-cs"/>
+              </a:defRPr>
+            </a:lvl4pPr>
+            <a:lvl5pPr marL="1828800" indent="0" algn="l" defTabSz="914400" rtl="0" eaLnBrk="1" latinLnBrk="0" hangingPunct="1">
+              <a:lnSpc>
+                <a:spcPct val="90000"/>
+              </a:lnSpc>
+              <a:spcBef>
+                <a:spcPts val="500"/>
+              </a:spcBef>
+              <a:buFont typeface="Arial" panose="020B0604020202020204" pitchFamily="34" charset="0"/>
+              <a:buNone/>
+              <a:defRPr sz="1600" kern="1200">
+                <a:solidFill>
+                  <a:schemeClr val="tx1">
+                    <a:tint val="75000"/>
+                  </a:schemeClr>
+                </a:solidFill>
+                <a:latin typeface="+mn-lt"/>
+                <a:ea typeface="+mn-ea"/>
+                <a:cs typeface="+mn-cs"/>
+              </a:defRPr>
+            </a:lvl5pPr>
+            <a:lvl6pPr marL="2286000" indent="0" algn="l" defTabSz="914400" rtl="0" eaLnBrk="1" latinLnBrk="0" hangingPunct="1">
+              <a:lnSpc>
+                <a:spcPct val="90000"/>
+              </a:lnSpc>
+              <a:spcBef>
+                <a:spcPts val="500"/>
+              </a:spcBef>
+              <a:buFont typeface="Arial" panose="020B0604020202020204" pitchFamily="34" charset="0"/>
+              <a:buNone/>
+              <a:defRPr sz="1600" kern="1200">
+                <a:solidFill>
+                  <a:schemeClr val="tx1">
+                    <a:tint val="75000"/>
+                  </a:schemeClr>
+                </a:solidFill>
+                <a:latin typeface="+mn-lt"/>
+                <a:ea typeface="+mn-ea"/>
+                <a:cs typeface="+mn-cs"/>
+              </a:defRPr>
+            </a:lvl6pPr>
+            <a:lvl7pPr marL="2743200" indent="0" algn="l" defTabSz="914400" rtl="0" eaLnBrk="1" latinLnBrk="0" hangingPunct="1">
+              <a:lnSpc>
+                <a:spcPct val="90000"/>
+              </a:lnSpc>
+              <a:spcBef>
+                <a:spcPts val="500"/>
+              </a:spcBef>
+              <a:buFont typeface="Arial" panose="020B0604020202020204" pitchFamily="34" charset="0"/>
+              <a:buNone/>
+              <a:defRPr sz="1600" kern="1200">
+                <a:solidFill>
+                  <a:schemeClr val="tx1">
+                    <a:tint val="75000"/>
+                  </a:schemeClr>
+                </a:solidFill>
+                <a:latin typeface="+mn-lt"/>
+                <a:ea typeface="+mn-ea"/>
+                <a:cs typeface="+mn-cs"/>
+              </a:defRPr>
+            </a:lvl7pPr>
+            <a:lvl8pPr marL="3200400" indent="0" algn="l" defTabSz="914400" rtl="0" eaLnBrk="1" latinLnBrk="0" hangingPunct="1">
+              <a:lnSpc>
+                <a:spcPct val="90000"/>
+              </a:lnSpc>
+              <a:spcBef>
+                <a:spcPts val="500"/>
+              </a:spcBef>
+              <a:buFont typeface="Arial" panose="020B0604020202020204" pitchFamily="34" charset="0"/>
+              <a:buNone/>
+              <a:defRPr sz="1600" kern="1200">
+                <a:solidFill>
+                  <a:schemeClr val="tx1">
+                    <a:tint val="75000"/>
+                  </a:schemeClr>
+                </a:solidFill>
+                <a:latin typeface="+mn-lt"/>
+                <a:ea typeface="+mn-ea"/>
+                <a:cs typeface="+mn-cs"/>
+              </a:defRPr>
+            </a:lvl8pPr>
+            <a:lvl9pPr marL="3657600" indent="0" algn="l" defTabSz="914400" rtl="0" eaLnBrk="1" latinLnBrk="0" hangingPunct="1">
+              <a:lnSpc>
+                <a:spcPct val="90000"/>
+              </a:lnSpc>
+              <a:spcBef>
+                <a:spcPts val="500"/>
+              </a:spcBef>
+              <a:buFont typeface="Arial" panose="020B0604020202020204" pitchFamily="34" charset="0"/>
+              <a:buNone/>
+              <a:defRPr sz="1600" kern="1200">
+                <a:solidFill>
+                  <a:schemeClr val="tx1">
+                    <a:tint val="75000"/>
+                  </a:schemeClr>
+                </a:solidFill>
+                <a:latin typeface="+mn-lt"/>
+                <a:ea typeface="+mn-ea"/>
+                <a:cs typeface="+mn-cs"/>
+              </a:defRPr>
+            </a:lvl9pPr>
+          </a:lstStyle>
+          <a:p>
+            <a:endParaRPr lang="en-US" dirty="0"/>
+          </a:p>
+        </p:txBody>
+      </p:sp>
+      <p:sp>
+        <p:nvSpPr>
+          <p:cNvPr id="24" name="Text Placeholder 18">
+            <a:extLst>
+              <a:ext uri="{FF2B5EF4-FFF2-40B4-BE49-F238E27FC236}">
+                <a16:creationId xmlns:a16="http://schemas.microsoft.com/office/drawing/2014/main" id="{8234948E-8730-4E87-B7C0-A849550DADA1}"/>
+              </a:ext>
+            </a:extLst>
+          </p:cNvPr>
+          <p:cNvSpPr txBox="1">
+            <a:spLocks/>
+          </p:cNvSpPr>
+          <p:nvPr/>
+        </p:nvSpPr>
+        <p:spPr>
+          <a:xfrm>
+            <a:off x="778643" y="2110352"/>
+            <a:ext cx="1209357" cy="640080"/>
+          </a:xfrm>
+          <a:prstGeom prst="rect">
+            <a:avLst/>
+          </a:prstGeom>
+        </p:spPr>
+        <p:txBody>
+          <a:bodyPr vert="horz" lIns="0" tIns="0" rIns="0" bIns="0" rtlCol="0">
+            <a:normAutofit/>
+          </a:bodyPr>
+          <a:lstStyle>
+            <a:lvl1pPr marL="0" indent="0" algn="l" defTabSz="914400" rtl="0" eaLnBrk="1" latinLnBrk="0" hangingPunct="1">
+              <a:lnSpc>
+                <a:spcPct val="90000"/>
+              </a:lnSpc>
+              <a:spcBef>
+                <a:spcPts val="600"/>
+              </a:spcBef>
+              <a:buClr>
+                <a:schemeClr val="tx1"/>
+              </a:buClr>
+              <a:buFont typeface="Courier New" panose="02070309020205020404" pitchFamily="49" charset="0"/>
+              <a:buNone/>
+              <a:defRPr sz="2000" b="1" kern="1200">
+                <a:solidFill>
+                  <a:schemeClr val="bg2"/>
+                </a:solidFill>
+                <a:latin typeface="+mj-lt"/>
+                <a:ea typeface="+mn-ea"/>
+                <a:cs typeface="+mn-cs"/>
+              </a:defRPr>
+            </a:lvl1pPr>
+            <a:lvl2pPr marL="457200" indent="0" algn="l" defTabSz="914400" rtl="0" eaLnBrk="1" latinLnBrk="0" hangingPunct="1">
+              <a:lnSpc>
+                <a:spcPct val="90000"/>
+              </a:lnSpc>
+              <a:spcBef>
+                <a:spcPts val="500"/>
+              </a:spcBef>
+              <a:buFont typeface="Arial" panose="020B0604020202020204" pitchFamily="34" charset="0"/>
+              <a:buNone/>
+              <a:defRPr sz="2000" kern="1200">
+                <a:solidFill>
+                  <a:schemeClr val="tx1">
+                    <a:tint val="75000"/>
+                  </a:schemeClr>
+                </a:solidFill>
+                <a:latin typeface="+mn-lt"/>
+                <a:ea typeface="+mn-ea"/>
+                <a:cs typeface="+mn-cs"/>
+              </a:defRPr>
+            </a:lvl2pPr>
+            <a:lvl3pPr marL="914400" indent="0" algn="l" defTabSz="914400" rtl="0" eaLnBrk="1" latinLnBrk="0" hangingPunct="1">
+              <a:lnSpc>
+                <a:spcPct val="90000"/>
+              </a:lnSpc>
+              <a:spcBef>
+                <a:spcPts val="500"/>
+              </a:spcBef>
+              <a:buFont typeface="Arial" panose="020B0604020202020204" pitchFamily="34" charset="0"/>
+              <a:buNone/>
+              <a:defRPr sz="1800" kern="1200">
+                <a:solidFill>
+                  <a:schemeClr val="tx1">
+                    <a:tint val="75000"/>
+                  </a:schemeClr>
+                </a:solidFill>
+                <a:latin typeface="+mn-lt"/>
+                <a:ea typeface="+mn-ea"/>
+                <a:cs typeface="+mn-cs"/>
+              </a:defRPr>
+            </a:lvl3pPr>
+            <a:lvl4pPr marL="1371600" indent="0" algn="l" defTabSz="914400" rtl="0" eaLnBrk="1" latinLnBrk="0" hangingPunct="1">
+              <a:lnSpc>
+                <a:spcPct val="90000"/>
+              </a:lnSpc>
+              <a:spcBef>
+                <a:spcPts val="500"/>
+              </a:spcBef>
+              <a:buFont typeface="Arial" panose="020B0604020202020204" pitchFamily="34" charset="0"/>
+              <a:buNone/>
+              <a:defRPr sz="1600" kern="1200">
+                <a:solidFill>
+                  <a:schemeClr val="tx1">
+                    <a:tint val="75000"/>
+                  </a:schemeClr>
+                </a:solidFill>
+                <a:latin typeface="+mn-lt"/>
+                <a:ea typeface="+mn-ea"/>
+                <a:cs typeface="+mn-cs"/>
+              </a:defRPr>
+            </a:lvl4pPr>
+            <a:lvl5pPr marL="1828800" indent="0" algn="l" defTabSz="914400" rtl="0" eaLnBrk="1" latinLnBrk="0" hangingPunct="1">
+              <a:lnSpc>
+                <a:spcPct val="90000"/>
+              </a:lnSpc>
+              <a:spcBef>
+                <a:spcPts val="500"/>
+              </a:spcBef>
+              <a:buFont typeface="Arial" panose="020B0604020202020204" pitchFamily="34" charset="0"/>
+              <a:buNone/>
+              <a:defRPr sz="1600" kern="1200">
+                <a:solidFill>
+                  <a:schemeClr val="tx1">
+                    <a:tint val="75000"/>
+                  </a:schemeClr>
+                </a:solidFill>
+                <a:latin typeface="+mn-lt"/>
+                <a:ea typeface="+mn-ea"/>
+                <a:cs typeface="+mn-cs"/>
+              </a:defRPr>
+            </a:lvl5pPr>
+            <a:lvl6pPr marL="2286000" indent="0" algn="l" defTabSz="914400" rtl="0" eaLnBrk="1" latinLnBrk="0" hangingPunct="1">
+              <a:lnSpc>
+                <a:spcPct val="90000"/>
+              </a:lnSpc>
+              <a:spcBef>
+                <a:spcPts val="500"/>
+              </a:spcBef>
+              <a:buFont typeface="Arial" panose="020B0604020202020204" pitchFamily="34" charset="0"/>
+              <a:buNone/>
+              <a:defRPr sz="1600" kern="1200">
+                <a:solidFill>
+                  <a:schemeClr val="tx1">
+                    <a:tint val="75000"/>
+                  </a:schemeClr>
+                </a:solidFill>
+                <a:latin typeface="+mn-lt"/>
+                <a:ea typeface="+mn-ea"/>
+                <a:cs typeface="+mn-cs"/>
+              </a:defRPr>
+            </a:lvl6pPr>
+            <a:lvl7pPr marL="2743200" indent="0" algn="l" defTabSz="914400" rtl="0" eaLnBrk="1" latinLnBrk="0" hangingPunct="1">
+              <a:lnSpc>
+                <a:spcPct val="90000"/>
+              </a:lnSpc>
+              <a:spcBef>
+                <a:spcPts val="500"/>
+              </a:spcBef>
+              <a:buFont typeface="Arial" panose="020B0604020202020204" pitchFamily="34" charset="0"/>
+              <a:buNone/>
+              <a:defRPr sz="1600" kern="1200">
+                <a:solidFill>
+                  <a:schemeClr val="tx1">
+                    <a:tint val="75000"/>
+                  </a:schemeClr>
+                </a:solidFill>
+                <a:latin typeface="+mn-lt"/>
+                <a:ea typeface="+mn-ea"/>
+                <a:cs typeface="+mn-cs"/>
+              </a:defRPr>
+            </a:lvl7pPr>
+            <a:lvl8pPr marL="3200400" indent="0" algn="l" defTabSz="914400" rtl="0" eaLnBrk="1" latinLnBrk="0" hangingPunct="1">
+              <a:lnSpc>
+                <a:spcPct val="90000"/>
+              </a:lnSpc>
+              <a:spcBef>
+                <a:spcPts val="500"/>
+              </a:spcBef>
+              <a:buFont typeface="Arial" panose="020B0604020202020204" pitchFamily="34" charset="0"/>
+              <a:buNone/>
+              <a:defRPr sz="1600" kern="1200">
+                <a:solidFill>
+                  <a:schemeClr val="tx1">
+                    <a:tint val="75000"/>
+                  </a:schemeClr>
+                </a:solidFill>
+                <a:latin typeface="+mn-lt"/>
+                <a:ea typeface="+mn-ea"/>
+                <a:cs typeface="+mn-cs"/>
+              </a:defRPr>
+            </a:lvl8pPr>
+            <a:lvl9pPr marL="3657600" indent="0" algn="l" defTabSz="914400" rtl="0" eaLnBrk="1" latinLnBrk="0" hangingPunct="1">
+              <a:lnSpc>
+                <a:spcPct val="90000"/>
+              </a:lnSpc>
+              <a:spcBef>
+                <a:spcPts val="500"/>
+              </a:spcBef>
+              <a:buFont typeface="Arial" panose="020B0604020202020204" pitchFamily="34" charset="0"/>
+              <a:buNone/>
+              <a:defRPr sz="1600" kern="1200">
+                <a:solidFill>
+                  <a:schemeClr val="tx1">
+                    <a:tint val="75000"/>
+                  </a:schemeClr>
+                </a:solidFill>
+                <a:latin typeface="+mn-lt"/>
+                <a:ea typeface="+mn-ea"/>
+                <a:cs typeface="+mn-cs"/>
+              </a:defRPr>
+            </a:lvl9pPr>
+          </a:lstStyle>
+          <a:p>
+            <a:r>
+              <a:rPr lang="en-US" dirty="0"/>
+              <a:t>Create Studio</a:t>
+            </a:r>
+          </a:p>
+        </p:txBody>
+      </p:sp>
+      <p:pic>
+        <p:nvPicPr>
+          <p:cNvPr id="25" name="Picture Placeholder 20" descr="Atom icon">
+            <a:extLst>
+              <a:ext uri="{FF2B5EF4-FFF2-40B4-BE49-F238E27FC236}">
+                <a16:creationId xmlns:a16="http://schemas.microsoft.com/office/drawing/2014/main" id="{16937928-607D-47DF-8173-4DC8BF80DD50}"/>
+              </a:ext>
+            </a:extLst>
+          </p:cNvPr>
+          <p:cNvPicPr>
+            <a:picLocks noChangeAspect="1"/>
+          </p:cNvPicPr>
+          <p:nvPr/>
+        </p:nvPicPr>
+        <p:blipFill>
+          <a:blip r:embed="rId8">
+            <a:extLst>
+              <a:ext uri="{28A0092B-C50C-407E-A947-70E740481C1C}">
+                <a14:useLocalDpi xmlns:a14="http://schemas.microsoft.com/office/drawing/2010/main" val="0"/>
+              </a:ext>
+              <a:ext uri="{96DAC541-7B7A-43D3-8B79-37D633B846F1}">
+                <asvg:svgBlip xmlns:asvg="http://schemas.microsoft.com/office/drawing/2016/SVG/main" r:embed="rId9"/>
+              </a:ext>
+            </a:extLst>
+          </a:blip>
+          <a:srcRect l="1329" r="1329"/>
+          <a:stretch>
+            <a:fillRect/>
+          </a:stretch>
+        </p:blipFill>
+        <p:spPr>
+          <a:xfrm>
+            <a:off x="2037253" y="2092064"/>
+            <a:ext cx="640080" cy="658368"/>
+          </a:xfrm>
+          <a:prstGeom prst="rect">
+            <a:avLst/>
+          </a:prstGeom>
+        </p:spPr>
+      </p:pic>
+      <p:sp>
+        <p:nvSpPr>
+          <p:cNvPr id="26" name="Text Placeholder 16">
+            <a:extLst>
+              <a:ext uri="{FF2B5EF4-FFF2-40B4-BE49-F238E27FC236}">
+                <a16:creationId xmlns:a16="http://schemas.microsoft.com/office/drawing/2014/main" id="{B82F7B86-34D5-44AF-A553-2644E9BD43CE}"/>
+              </a:ext>
+            </a:extLst>
+          </p:cNvPr>
+          <p:cNvSpPr txBox="1">
+            <a:spLocks/>
+          </p:cNvSpPr>
+          <p:nvPr/>
+        </p:nvSpPr>
+        <p:spPr>
+          <a:xfrm>
+            <a:off x="2867262" y="2110352"/>
+            <a:ext cx="2670048" cy="640080"/>
+          </a:xfrm>
+          <a:prstGeom prst="rect">
+            <a:avLst/>
+          </a:prstGeom>
+        </p:spPr>
+        <p:txBody>
+          <a:bodyPr vert="horz" lIns="0" tIns="0" rIns="0" bIns="0" rtlCol="0">
+            <a:normAutofit/>
+          </a:bodyPr>
+          <a:lstStyle>
+            <a:lvl1pPr marL="0" indent="0" algn="l" defTabSz="914400" rtl="0" eaLnBrk="1" latinLnBrk="0" hangingPunct="1">
+              <a:lnSpc>
+                <a:spcPct val="100000"/>
+              </a:lnSpc>
+              <a:spcBef>
+                <a:spcPts val="600"/>
+              </a:spcBef>
+              <a:buClr>
+                <a:schemeClr val="tx1"/>
+              </a:buClr>
+              <a:buFont typeface="Courier New" panose="02070309020205020404" pitchFamily="49" charset="0"/>
+              <a:buNone/>
+              <a:defRPr sz="1400" kern="1200">
+                <a:solidFill>
+                  <a:schemeClr val="tx2"/>
+                </a:solidFill>
+                <a:latin typeface="+mn-lt"/>
+                <a:ea typeface="+mn-ea"/>
+                <a:cs typeface="+mn-cs"/>
+              </a:defRPr>
+            </a:lvl1pPr>
+            <a:lvl2pPr marL="457200" indent="0" algn="l" defTabSz="914400" rtl="0" eaLnBrk="1" latinLnBrk="0" hangingPunct="1">
+              <a:lnSpc>
+                <a:spcPct val="90000"/>
+              </a:lnSpc>
+              <a:spcBef>
+                <a:spcPts val="500"/>
+              </a:spcBef>
+              <a:buFont typeface="Arial" panose="020B0604020202020204" pitchFamily="34" charset="0"/>
+              <a:buNone/>
+              <a:defRPr sz="2000" kern="1200">
+                <a:solidFill>
+                  <a:schemeClr val="tx1">
+                    <a:tint val="75000"/>
+                  </a:schemeClr>
+                </a:solidFill>
+                <a:latin typeface="+mn-lt"/>
+                <a:ea typeface="+mn-ea"/>
+                <a:cs typeface="+mn-cs"/>
+              </a:defRPr>
+            </a:lvl2pPr>
+            <a:lvl3pPr marL="914400" indent="0" algn="l" defTabSz="914400" rtl="0" eaLnBrk="1" latinLnBrk="0" hangingPunct="1">
+              <a:lnSpc>
+                <a:spcPct val="90000"/>
+              </a:lnSpc>
+              <a:spcBef>
+                <a:spcPts val="500"/>
+              </a:spcBef>
+              <a:buFont typeface="Arial" panose="020B0604020202020204" pitchFamily="34" charset="0"/>
+              <a:buNone/>
+              <a:defRPr sz="1800" kern="1200">
+                <a:solidFill>
+                  <a:schemeClr val="tx1">
+                    <a:tint val="75000"/>
+                  </a:schemeClr>
+                </a:solidFill>
+                <a:latin typeface="+mn-lt"/>
+                <a:ea typeface="+mn-ea"/>
+                <a:cs typeface="+mn-cs"/>
+              </a:defRPr>
+            </a:lvl3pPr>
+            <a:lvl4pPr marL="1371600" indent="0" algn="l" defTabSz="914400" rtl="0" eaLnBrk="1" latinLnBrk="0" hangingPunct="1">
+              <a:lnSpc>
+                <a:spcPct val="90000"/>
+              </a:lnSpc>
+              <a:spcBef>
+                <a:spcPts val="500"/>
+              </a:spcBef>
+              <a:buFont typeface="Arial" panose="020B0604020202020204" pitchFamily="34" charset="0"/>
+              <a:buNone/>
+              <a:defRPr sz="1600" kern="1200">
+                <a:solidFill>
+                  <a:schemeClr val="tx1">
+                    <a:tint val="75000"/>
+                  </a:schemeClr>
+                </a:solidFill>
+                <a:latin typeface="+mn-lt"/>
+                <a:ea typeface="+mn-ea"/>
+                <a:cs typeface="+mn-cs"/>
+              </a:defRPr>
+            </a:lvl4pPr>
+            <a:lvl5pPr marL="1828800" indent="0" algn="l" defTabSz="914400" rtl="0" eaLnBrk="1" latinLnBrk="0" hangingPunct="1">
+              <a:lnSpc>
+                <a:spcPct val="90000"/>
+              </a:lnSpc>
+              <a:spcBef>
+                <a:spcPts val="500"/>
+              </a:spcBef>
+              <a:buFont typeface="Arial" panose="020B0604020202020204" pitchFamily="34" charset="0"/>
+              <a:buNone/>
+              <a:defRPr sz="1600" kern="1200">
+                <a:solidFill>
+                  <a:schemeClr val="tx1">
+                    <a:tint val="75000"/>
+                  </a:schemeClr>
+                </a:solidFill>
+                <a:latin typeface="+mn-lt"/>
+                <a:ea typeface="+mn-ea"/>
+                <a:cs typeface="+mn-cs"/>
+              </a:defRPr>
+            </a:lvl5pPr>
+            <a:lvl6pPr marL="2286000" indent="0" algn="l" defTabSz="914400" rtl="0" eaLnBrk="1" latinLnBrk="0" hangingPunct="1">
+              <a:lnSpc>
+                <a:spcPct val="90000"/>
+              </a:lnSpc>
+              <a:spcBef>
+                <a:spcPts val="500"/>
+              </a:spcBef>
+              <a:buFont typeface="Arial" panose="020B0604020202020204" pitchFamily="34" charset="0"/>
+              <a:buNone/>
+              <a:defRPr sz="1600" kern="1200">
+                <a:solidFill>
+                  <a:schemeClr val="tx1">
+                    <a:tint val="75000"/>
+                  </a:schemeClr>
+                </a:solidFill>
+                <a:latin typeface="+mn-lt"/>
+                <a:ea typeface="+mn-ea"/>
+                <a:cs typeface="+mn-cs"/>
+              </a:defRPr>
+            </a:lvl6pPr>
+            <a:lvl7pPr marL="2743200" indent="0" algn="l" defTabSz="914400" rtl="0" eaLnBrk="1" latinLnBrk="0" hangingPunct="1">
+              <a:lnSpc>
+                <a:spcPct val="90000"/>
+              </a:lnSpc>
+              <a:spcBef>
+                <a:spcPts val="500"/>
+              </a:spcBef>
+              <a:buFont typeface="Arial" panose="020B0604020202020204" pitchFamily="34" charset="0"/>
+              <a:buNone/>
+              <a:defRPr sz="1600" kern="1200">
+                <a:solidFill>
+                  <a:schemeClr val="tx1">
+                    <a:tint val="75000"/>
+                  </a:schemeClr>
+                </a:solidFill>
+                <a:latin typeface="+mn-lt"/>
+                <a:ea typeface="+mn-ea"/>
+                <a:cs typeface="+mn-cs"/>
+              </a:defRPr>
+            </a:lvl7pPr>
+            <a:lvl8pPr marL="3200400" indent="0" algn="l" defTabSz="914400" rtl="0" eaLnBrk="1" latinLnBrk="0" hangingPunct="1">
+              <a:lnSpc>
+                <a:spcPct val="90000"/>
+              </a:lnSpc>
+              <a:spcBef>
+                <a:spcPts val="500"/>
+              </a:spcBef>
+              <a:buFont typeface="Arial" panose="020B0604020202020204" pitchFamily="34" charset="0"/>
+              <a:buNone/>
+              <a:defRPr sz="1600" kern="1200">
+                <a:solidFill>
+                  <a:schemeClr val="tx1">
+                    <a:tint val="75000"/>
+                  </a:schemeClr>
+                </a:solidFill>
+                <a:latin typeface="+mn-lt"/>
+                <a:ea typeface="+mn-ea"/>
+                <a:cs typeface="+mn-cs"/>
+              </a:defRPr>
+            </a:lvl8pPr>
+            <a:lvl9pPr marL="3657600" indent="0" algn="l" defTabSz="914400" rtl="0" eaLnBrk="1" latinLnBrk="0" hangingPunct="1">
+              <a:lnSpc>
+                <a:spcPct val="90000"/>
+              </a:lnSpc>
+              <a:spcBef>
+                <a:spcPts val="500"/>
+              </a:spcBef>
+              <a:buFont typeface="Arial" panose="020B0604020202020204" pitchFamily="34" charset="0"/>
+              <a:buNone/>
+              <a:defRPr sz="1600" kern="1200">
+                <a:solidFill>
+                  <a:schemeClr val="tx1">
+                    <a:tint val="75000"/>
+                  </a:schemeClr>
+                </a:solidFill>
+                <a:latin typeface="+mn-lt"/>
+                <a:ea typeface="+mn-ea"/>
+                <a:cs typeface="+mn-cs"/>
+              </a:defRPr>
+            </a:lvl9pPr>
+          </a:lstStyle>
+          <a:p>
+            <a:r>
+              <a:rPr lang="en-US" dirty="0"/>
+              <a:t>Django, </a:t>
+            </a:r>
+            <a:r>
+              <a:rPr lang="en-US" dirty="0" err="1"/>
+              <a:t>sqllite</a:t>
+            </a:r>
+            <a:endParaRPr lang="en-US" dirty="0"/>
           </a:p>
         </p:txBody>
       </p:sp>
@@ -45567,12 +46598,115 @@
           <a:chExt cx="0" cy="0"/>
         </a:xfrm>
       </p:grpSpPr>
+      <p:sp>
+        <p:nvSpPr>
+          <p:cNvPr id="2" name="Title 1">
+            <a:extLst>
+              <a:ext uri="{FF2B5EF4-FFF2-40B4-BE49-F238E27FC236}">
+                <a16:creationId xmlns:a16="http://schemas.microsoft.com/office/drawing/2014/main" id="{134CB059-9E3B-4C24-8E61-717292C2944E}"/>
+              </a:ext>
+            </a:extLst>
+          </p:cNvPr>
+          <p:cNvSpPr>
+            <a:spLocks noGrp="1"/>
+          </p:cNvSpPr>
+          <p:nvPr>
+            <p:ph type="title"/>
+          </p:nvPr>
+        </p:nvSpPr>
+        <p:spPr/>
+        <p:txBody>
+          <a:bodyPr/>
+          <a:lstStyle/>
+          <a:p>
+            <a:r>
+              <a:rPr lang="en-US" dirty="0"/>
+              <a:t>PROBLEMS</a:t>
+            </a:r>
+          </a:p>
+        </p:txBody>
+      </p:sp>
+      <p:sp>
+        <p:nvSpPr>
+          <p:cNvPr id="3" name="Text Placeholder 2">
+            <a:extLst>
+              <a:ext uri="{FF2B5EF4-FFF2-40B4-BE49-F238E27FC236}">
+                <a16:creationId xmlns:a16="http://schemas.microsoft.com/office/drawing/2014/main" id="{E66139D5-668D-4A3D-B6B6-F71EC385C8FF}"/>
+              </a:ext>
+            </a:extLst>
+          </p:cNvPr>
+          <p:cNvSpPr>
+            <a:spLocks noGrp="1"/>
+          </p:cNvSpPr>
+          <p:nvPr>
+            <p:ph type="body" idx="1"/>
+          </p:nvPr>
+        </p:nvSpPr>
+        <p:spPr/>
+        <p:txBody>
+          <a:bodyPr/>
+          <a:lstStyle/>
+          <a:p>
+            <a:r>
+              <a:rPr lang="en-US" dirty="0"/>
+              <a:t>We encountered this time</a:t>
+            </a:r>
+          </a:p>
+        </p:txBody>
+      </p:sp>
+      <p:sp>
+        <p:nvSpPr>
+          <p:cNvPr id="8" name="Text Placeholder 7">
+            <a:extLst>
+              <a:ext uri="{FF2B5EF4-FFF2-40B4-BE49-F238E27FC236}">
+                <a16:creationId xmlns:a16="http://schemas.microsoft.com/office/drawing/2014/main" id="{EEA947F5-DD66-4D26-BA34-D1D8F7CE9010}"/>
+              </a:ext>
+            </a:extLst>
+          </p:cNvPr>
+          <p:cNvSpPr>
+            <a:spLocks noGrp="1"/>
+          </p:cNvSpPr>
+          <p:nvPr>
+            <p:ph type="body" idx="14"/>
+          </p:nvPr>
+        </p:nvSpPr>
+        <p:spPr>
+          <a:xfrm>
+            <a:off x="815720" y="3869348"/>
+            <a:ext cx="5013452" cy="2009371"/>
+          </a:xfrm>
+        </p:spPr>
+        <p:txBody>
+          <a:bodyPr>
+            <a:normAutofit/>
+          </a:bodyPr>
+          <a:lstStyle/>
+          <a:p>
+            <a:pPr marL="0" indent="0">
+              <a:buNone/>
+            </a:pPr>
+            <a:endParaRPr lang="en-US" dirty="0"/>
+          </a:p>
+          <a:p>
+            <a:r>
+              <a:rPr lang="en-US" dirty="0"/>
+              <a:t>Ajax problems</a:t>
+            </a:r>
+          </a:p>
+          <a:p>
+            <a:r>
+              <a:rPr lang="en-US" dirty="0"/>
+              <a:t>Cannot play song when clicking the start, “.load()” function</a:t>
+            </a:r>
+          </a:p>
+        </p:txBody>
+      </p:sp>
       <p:pic>
         <p:nvPicPr>
-          <p:cNvPr id="11" name="Picture Placeholder 10" descr="Company logo">
-            <a:extLst>
-              <a:ext uri="{FF2B5EF4-FFF2-40B4-BE49-F238E27FC236}">
-                <a16:creationId xmlns:a16="http://schemas.microsoft.com/office/drawing/2014/main" id="{F137CA39-CE16-4C0C-AFB5-324FE940E664}"/>
+          <p:cNvPr id="13" name="Picture Placeholder 12" descr="Abstract background">
+            <a:extLst>
+              <a:ext uri="{FF2B5EF4-FFF2-40B4-BE49-F238E27FC236}">
+                <a16:creationId xmlns:a16="http://schemas.microsoft.com/office/drawing/2014/main" id="{0B7AE772-6658-4E84-8EAA-F33DEF1CDE4F}"/>
               </a:ext>
             </a:extLst>
           </p:cNvPr>
@@ -45580,7 +46714,7 @@
             <a:picLocks noGrp="1" noChangeAspect="1"/>
           </p:cNvPicPr>
           <p:nvPr>
-            <p:ph type="pic" sz="quarter" idx="13"/>
+            <p:ph type="pic" sz="quarter" idx="15"/>
           </p:nvPr>
         </p:nvPicPr>
         <p:blipFill>
@@ -45588,9 +46722,6 @@
             <a:extLst>
               <a:ext uri="{28A0092B-C50C-407E-A947-70E740481C1C}">
                 <a14:useLocalDpi xmlns:a14="http://schemas.microsoft.com/office/drawing/2010/main" val="0"/>
-              </a:ext>
-              <a:ext uri="{96DAC541-7B7A-43D3-8B79-37D633B846F1}">
-                <asvg:svgBlip xmlns:asvg="http://schemas.microsoft.com/office/drawing/2016/SVG/main" r:embed="rId3"/>
               </a:ext>
             </a:extLst>
           </a:blip>
@@ -45603,134 +46734,6 @@
       </p:pic>
       <p:sp>
         <p:nvSpPr>
-          <p:cNvPr id="2" name="Title 1">
-            <a:extLst>
-              <a:ext uri="{FF2B5EF4-FFF2-40B4-BE49-F238E27FC236}">
-                <a16:creationId xmlns:a16="http://schemas.microsoft.com/office/drawing/2014/main" id="{134CB059-9E3B-4C24-8E61-717292C2944E}"/>
-              </a:ext>
-            </a:extLst>
-          </p:cNvPr>
-          <p:cNvSpPr>
-            <a:spLocks noGrp="1"/>
-          </p:cNvSpPr>
-          <p:nvPr>
-            <p:ph type="title"/>
-          </p:nvPr>
-        </p:nvSpPr>
-        <p:spPr/>
-        <p:txBody>
-          <a:bodyPr/>
-          <a:lstStyle/>
-          <a:p>
-            <a:r>
-              <a:rPr lang="en-US" dirty="0"/>
-              <a:t>PROBLEMS</a:t>
-            </a:r>
-          </a:p>
-        </p:txBody>
-      </p:sp>
-      <p:sp>
-        <p:nvSpPr>
-          <p:cNvPr id="3" name="Text Placeholder 2">
-            <a:extLst>
-              <a:ext uri="{FF2B5EF4-FFF2-40B4-BE49-F238E27FC236}">
-                <a16:creationId xmlns:a16="http://schemas.microsoft.com/office/drawing/2014/main" id="{E66139D5-668D-4A3D-B6B6-F71EC385C8FF}"/>
-              </a:ext>
-            </a:extLst>
-          </p:cNvPr>
-          <p:cNvSpPr>
-            <a:spLocks noGrp="1"/>
-          </p:cNvSpPr>
-          <p:nvPr>
-            <p:ph type="body" idx="1"/>
-          </p:nvPr>
-        </p:nvSpPr>
-        <p:spPr/>
-        <p:txBody>
-          <a:bodyPr/>
-          <a:lstStyle/>
-          <a:p>
-            <a:r>
-              <a:rPr lang="en-US" dirty="0"/>
-              <a:t>Will be solved in </a:t>
-            </a:r>
-            <a:r>
-              <a:rPr lang="en-US"/>
-              <a:t>the future</a:t>
-            </a:r>
-            <a:endParaRPr lang="en-US" dirty="0"/>
-          </a:p>
-        </p:txBody>
-      </p:sp>
-      <p:sp>
-        <p:nvSpPr>
-          <p:cNvPr id="8" name="Text Placeholder 7">
-            <a:extLst>
-              <a:ext uri="{FF2B5EF4-FFF2-40B4-BE49-F238E27FC236}">
-                <a16:creationId xmlns:a16="http://schemas.microsoft.com/office/drawing/2014/main" id="{EEA947F5-DD66-4D26-BA34-D1D8F7CE9010}"/>
-              </a:ext>
-            </a:extLst>
-          </p:cNvPr>
-          <p:cNvSpPr>
-            <a:spLocks noGrp="1"/>
-          </p:cNvSpPr>
-          <p:nvPr>
-            <p:ph type="body" idx="14"/>
-          </p:nvPr>
-        </p:nvSpPr>
-        <p:spPr/>
-        <p:txBody>
-          <a:bodyPr>
-            <a:normAutofit/>
-          </a:bodyPr>
-          <a:lstStyle/>
-          <a:p>
-            <a:endParaRPr lang="en-US" dirty="0"/>
-          </a:p>
-          <a:p>
-            <a:r>
-              <a:rPr lang="en-US" dirty="0"/>
-              <a:t>Some songs cannot be played. They cannot go through the Form validation check</a:t>
-            </a:r>
-          </a:p>
-          <a:p>
-            <a:endParaRPr lang="en-US" dirty="0"/>
-          </a:p>
-        </p:txBody>
-      </p:sp>
-      <p:pic>
-        <p:nvPicPr>
-          <p:cNvPr id="13" name="Picture Placeholder 12" descr="Abstract background">
-            <a:extLst>
-              <a:ext uri="{FF2B5EF4-FFF2-40B4-BE49-F238E27FC236}">
-                <a16:creationId xmlns:a16="http://schemas.microsoft.com/office/drawing/2014/main" id="{0B7AE772-6658-4E84-8EAA-F33DEF1CDE4F}"/>
-              </a:ext>
-            </a:extLst>
-          </p:cNvPr>
-          <p:cNvPicPr>
-            <a:picLocks noGrp="1" noChangeAspect="1"/>
-          </p:cNvPicPr>
-          <p:nvPr>
-            <p:ph type="pic" sz="quarter" idx="15"/>
-          </p:nvPr>
-        </p:nvPicPr>
-        <p:blipFill>
-          <a:blip r:embed="rId4">
-            <a:extLst>
-              <a:ext uri="{28A0092B-C50C-407E-A947-70E740481C1C}">
-                <a14:useLocalDpi xmlns:a14="http://schemas.microsoft.com/office/drawing/2010/main" val="0"/>
-              </a:ext>
-            </a:extLst>
-          </a:blip>
-          <a:srcRect/>
-          <a:stretch>
-            <a:fillRect/>
-          </a:stretch>
-        </p:blipFill>
-        <p:spPr/>
-      </p:pic>
-      <p:sp>
-        <p:nvSpPr>
           <p:cNvPr id="6" name="Slide Number Placeholder 5">
             <a:extLst>
               <a:ext uri="{FF2B5EF4-FFF2-40B4-BE49-F238E27FC236}">
@@ -45789,7 +46792,7 @@
     </p:spTree>
     <p:extLst>
       <p:ext uri="{BB962C8B-B14F-4D97-AF65-F5344CB8AC3E}">
-        <p14:creationId xmlns:p14="http://schemas.microsoft.com/office/powerpoint/2010/main" val="3766803063"/>
+        <p14:creationId xmlns:p14="http://schemas.microsoft.com/office/powerpoint/2010/main" val="2731184621"/>
       </p:ext>
     </p:extLst>
   </p:cSld>
@@ -45816,12 +46819,138 @@
           <a:chExt cx="0" cy="0"/>
         </a:xfrm>
       </p:grpSpPr>
+      <p:sp>
+        <p:nvSpPr>
+          <p:cNvPr id="2" name="Title 1">
+            <a:extLst>
+              <a:ext uri="{FF2B5EF4-FFF2-40B4-BE49-F238E27FC236}">
+                <a16:creationId xmlns:a16="http://schemas.microsoft.com/office/drawing/2014/main" id="{134CB059-9E3B-4C24-8E61-717292C2944E}"/>
+              </a:ext>
+            </a:extLst>
+          </p:cNvPr>
+          <p:cNvSpPr>
+            <a:spLocks noGrp="1"/>
+          </p:cNvSpPr>
+          <p:nvPr>
+            <p:ph type="title"/>
+          </p:nvPr>
+        </p:nvSpPr>
+        <p:spPr/>
+        <p:txBody>
+          <a:bodyPr/>
+          <a:lstStyle/>
+          <a:p>
+            <a:r>
+              <a:rPr lang="en-US" dirty="0"/>
+              <a:t>PROBLEMS</a:t>
+            </a:r>
+          </a:p>
+        </p:txBody>
+      </p:sp>
+      <p:sp>
+        <p:nvSpPr>
+          <p:cNvPr id="3" name="Text Placeholder 2">
+            <a:extLst>
+              <a:ext uri="{FF2B5EF4-FFF2-40B4-BE49-F238E27FC236}">
+                <a16:creationId xmlns:a16="http://schemas.microsoft.com/office/drawing/2014/main" id="{E66139D5-668D-4A3D-B6B6-F71EC385C8FF}"/>
+              </a:ext>
+            </a:extLst>
+          </p:cNvPr>
+          <p:cNvSpPr>
+            <a:spLocks noGrp="1"/>
+          </p:cNvSpPr>
+          <p:nvPr>
+            <p:ph type="body" idx="1"/>
+          </p:nvPr>
+        </p:nvSpPr>
+        <p:spPr/>
+        <p:txBody>
+          <a:bodyPr/>
+          <a:lstStyle/>
+          <a:p>
+            <a:r>
+              <a:rPr lang="en-US" dirty="0"/>
+              <a:t>Will be solved in </a:t>
+            </a:r>
+            <a:r>
+              <a:rPr lang="en-US"/>
+              <a:t>the future</a:t>
+            </a:r>
+            <a:endParaRPr lang="en-US" dirty="0"/>
+          </a:p>
+        </p:txBody>
+      </p:sp>
+      <p:sp>
+        <p:nvSpPr>
+          <p:cNvPr id="8" name="Text Placeholder 7">
+            <a:extLst>
+              <a:ext uri="{FF2B5EF4-FFF2-40B4-BE49-F238E27FC236}">
+                <a16:creationId xmlns:a16="http://schemas.microsoft.com/office/drawing/2014/main" id="{EEA947F5-DD66-4D26-BA34-D1D8F7CE9010}"/>
+              </a:ext>
+            </a:extLst>
+          </p:cNvPr>
+          <p:cNvSpPr>
+            <a:spLocks noGrp="1"/>
+          </p:cNvSpPr>
+          <p:nvPr>
+            <p:ph type="body" idx="14"/>
+          </p:nvPr>
+        </p:nvSpPr>
+        <p:spPr>
+          <a:xfrm>
+            <a:off x="815720" y="3869348"/>
+            <a:ext cx="5013452" cy="2009371"/>
+          </a:xfrm>
+        </p:spPr>
+        <p:txBody>
+          <a:bodyPr>
+            <a:normAutofit/>
+          </a:bodyPr>
+          <a:lstStyle/>
+          <a:p>
+            <a:endParaRPr lang="en-US" dirty="0"/>
+          </a:p>
+          <a:p>
+            <a:r>
+              <a:rPr lang="en-US" dirty="0"/>
+              <a:t>Some songs cannot be played. They cannot go through the Form validation check</a:t>
+            </a:r>
+          </a:p>
+          <a:p>
+            <a:r>
+              <a:rPr lang="en-US" dirty="0"/>
+              <a:t>Need to integrate with React</a:t>
+            </a:r>
+          </a:p>
+          <a:p>
+            <a:r>
+              <a:rPr lang="en-US" dirty="0"/>
+              <a:t>Log in with social account, like Google</a:t>
+            </a:r>
+          </a:p>
+          <a:p>
+            <a:r>
+              <a:rPr lang="en-US" dirty="0"/>
+              <a:t>Change model</a:t>
+            </a:r>
+          </a:p>
+          <a:p>
+            <a:r>
+              <a:rPr lang="en-US" dirty="0"/>
+              <a:t>Can add multiple same songs, can like multiple same songs?</a:t>
+            </a:r>
+          </a:p>
+          <a:p>
+            <a:endParaRPr lang="en-US" dirty="0"/>
+          </a:p>
+        </p:txBody>
+      </p:sp>
       <p:pic>
         <p:nvPicPr>
-          <p:cNvPr id="10" name="Picture Placeholder 9" descr="Company logo">
-            <a:extLst>
-              <a:ext uri="{FF2B5EF4-FFF2-40B4-BE49-F238E27FC236}">
-                <a16:creationId xmlns:a16="http://schemas.microsoft.com/office/drawing/2014/main" id="{CA87F037-7DB2-45C9-A176-874E6A13B3A8}"/>
+          <p:cNvPr id="13" name="Picture Placeholder 12" descr="Abstract background">
+            <a:extLst>
+              <a:ext uri="{FF2B5EF4-FFF2-40B4-BE49-F238E27FC236}">
+                <a16:creationId xmlns:a16="http://schemas.microsoft.com/office/drawing/2014/main" id="{0B7AE772-6658-4E84-8EAA-F33DEF1CDE4F}"/>
               </a:ext>
             </a:extLst>
           </p:cNvPr>
@@ -45829,7 +46958,7 @@
             <a:picLocks noGrp="1" noChangeAspect="1"/>
           </p:cNvPicPr>
           <p:nvPr>
-            <p:ph type="pic" sz="quarter" idx="13"/>
+            <p:ph type="pic" sz="quarter" idx="15"/>
           </p:nvPr>
         </p:nvPicPr>
         <p:blipFill>
@@ -45837,9 +46966,6 @@
             <a:extLst>
               <a:ext uri="{28A0092B-C50C-407E-A947-70E740481C1C}">
                 <a14:useLocalDpi xmlns:a14="http://schemas.microsoft.com/office/drawing/2010/main" val="0"/>
-              </a:ext>
-              <a:ext uri="{96DAC541-7B7A-43D3-8B79-37D633B846F1}">
-                <asvg:svgBlip xmlns:asvg="http://schemas.microsoft.com/office/drawing/2016/SVG/main" r:embed="rId3"/>
               </a:ext>
             </a:extLst>
           </a:blip>
@@ -45850,142 +46976,12 @@
         </p:blipFill>
         <p:spPr/>
       </p:pic>
-      <p:pic>
-        <p:nvPicPr>
-          <p:cNvPr id="20" name="Picture Placeholder 19" descr="Abstract background">
-            <a:extLst>
-              <a:ext uri="{FF2B5EF4-FFF2-40B4-BE49-F238E27FC236}">
-                <a16:creationId xmlns:a16="http://schemas.microsoft.com/office/drawing/2014/main" id="{B9CF847D-0BA8-4D40-B95D-DAC8A415A56D}"/>
-              </a:ext>
-            </a:extLst>
-          </p:cNvPr>
-          <p:cNvPicPr>
-            <a:picLocks noGrp="1" noChangeAspect="1"/>
-          </p:cNvPicPr>
-          <p:nvPr>
-            <p:ph type="pic" sz="quarter" idx="15"/>
-          </p:nvPr>
-        </p:nvPicPr>
-        <p:blipFill>
-          <a:blip r:embed="rId4">
-            <a:extLst>
-              <a:ext uri="{28A0092B-C50C-407E-A947-70E740481C1C}">
-                <a14:useLocalDpi xmlns:a14="http://schemas.microsoft.com/office/drawing/2010/main" val="0"/>
-              </a:ext>
-            </a:extLst>
-          </a:blip>
-          <a:srcRect/>
-          <a:stretch>
-            <a:fillRect/>
-          </a:stretch>
-        </p:blipFill>
-        <p:spPr/>
-      </p:pic>
-      <p:sp>
-        <p:nvSpPr>
-          <p:cNvPr id="5" name="Title 4">
-            <a:extLst>
-              <a:ext uri="{FF2B5EF4-FFF2-40B4-BE49-F238E27FC236}">
-                <a16:creationId xmlns:a16="http://schemas.microsoft.com/office/drawing/2014/main" id="{953F70E9-6111-446A-BD49-B6A996FA030D}"/>
-              </a:ext>
-            </a:extLst>
-          </p:cNvPr>
-          <p:cNvSpPr>
-            <a:spLocks noGrp="1"/>
-          </p:cNvSpPr>
-          <p:nvPr>
-            <p:ph type="title"/>
-          </p:nvPr>
-        </p:nvSpPr>
-        <p:spPr/>
-        <p:txBody>
-          <a:bodyPr/>
-          <a:lstStyle/>
-          <a:p>
-            <a:r>
-              <a:rPr lang="en-US" dirty="0"/>
-              <a:t>SUMMARY</a:t>
-            </a:r>
-          </a:p>
-        </p:txBody>
-      </p:sp>
-      <p:sp>
-        <p:nvSpPr>
-          <p:cNvPr id="6" name="Text Placeholder 5">
-            <a:extLst>
-              <a:ext uri="{FF2B5EF4-FFF2-40B4-BE49-F238E27FC236}">
-                <a16:creationId xmlns:a16="http://schemas.microsoft.com/office/drawing/2014/main" id="{33221DE2-465E-4B89-BDBB-17EC727932B0}"/>
-              </a:ext>
-            </a:extLst>
-          </p:cNvPr>
-          <p:cNvSpPr>
-            <a:spLocks noGrp="1"/>
-          </p:cNvSpPr>
-          <p:nvPr>
-            <p:ph type="body" idx="1"/>
-          </p:nvPr>
-        </p:nvSpPr>
-        <p:spPr/>
-        <p:txBody>
-          <a:bodyPr/>
-          <a:lstStyle/>
-          <a:p>
-            <a:r>
-              <a:rPr lang="en-US" dirty="0"/>
-              <a:t>LOREM IPSUM DOLOR SIT AMET, CONSECTETUER ADIPISCING ELIT</a:t>
-            </a:r>
-          </a:p>
-        </p:txBody>
-      </p:sp>
-      <p:sp>
-        <p:nvSpPr>
-          <p:cNvPr id="8" name="Text Placeholder 7">
-            <a:extLst>
-              <a:ext uri="{FF2B5EF4-FFF2-40B4-BE49-F238E27FC236}">
-                <a16:creationId xmlns:a16="http://schemas.microsoft.com/office/drawing/2014/main" id="{7F9E6494-1485-4A3D-8CD3-31B5FAC16899}"/>
-              </a:ext>
-            </a:extLst>
-          </p:cNvPr>
-          <p:cNvSpPr>
-            <a:spLocks noGrp="1"/>
-          </p:cNvSpPr>
-          <p:nvPr>
-            <p:ph type="body" idx="14"/>
-          </p:nvPr>
-        </p:nvSpPr>
-        <p:spPr/>
-        <p:txBody>
-          <a:bodyPr/>
-          <a:lstStyle/>
-          <a:p>
-            <a:r>
-              <a:rPr lang="en-US" dirty="0"/>
-              <a:t>Lorem ipsum dolor sit amet, consectetuer adipiscing elit. Maecenas porttitor congue massa. Fusce posuere, magna sed pulvinar ultricies, purus lectus malesuada libero, sit amet commodo magna eros quis urna.</a:t>
-            </a:r>
-          </a:p>
-          <a:p>
-            <a:r>
-              <a:rPr lang="en-US" dirty="0"/>
-              <a:t>Nunc viverra imperdiet enim. Fusce est. Vivamus a tellus.</a:t>
-            </a:r>
-          </a:p>
-          <a:p>
-            <a:r>
-              <a:rPr lang="en-US" dirty="0"/>
-              <a:t>Pellentesque habitant morbi tristique senectus et netus et malesuada fames ac turpis egestas. Proin pharetra nonummy pede. Mauris et orci.</a:t>
-            </a:r>
-          </a:p>
-          <a:p>
-            <a:endParaRPr lang="en-US" dirty="0"/>
-          </a:p>
-        </p:txBody>
-      </p:sp>
-      <p:sp>
-        <p:nvSpPr>
-          <p:cNvPr id="4" name="Slide Number Placeholder 3">
-            <a:extLst>
-              <a:ext uri="{FF2B5EF4-FFF2-40B4-BE49-F238E27FC236}">
-                <a16:creationId xmlns:a16="http://schemas.microsoft.com/office/drawing/2014/main" id="{F9EB9F42-DBAC-4200-A2A6-96F4D943EB76}"/>
+      <p:sp>
+        <p:nvSpPr>
+          <p:cNvPr id="6" name="Slide Number Placeholder 5">
+            <a:extLst>
+              <a:ext uri="{FF2B5EF4-FFF2-40B4-BE49-F238E27FC236}">
+                <a16:creationId xmlns:a16="http://schemas.microsoft.com/office/drawing/2014/main" id="{2B9E0CB5-2F64-4439-AFE9-1BB3ACE6FA9D}"/>
               </a:ext>
             </a:extLst>
           </p:cNvPr>
@@ -46003,7 +46999,6 @@
           <a:p>
             <a:fld id="{8D581BC7-E183-40DB-AC97-C19EA4EB8894}" type="slidenum">
               <a:rPr lang="en-US" smtClean="0"/>
-              <a:pPr/>
               <a:t>7</a:t>
             </a:fld>
             <a:endParaRPr lang="en-US" dirty="0"/>
@@ -46012,10 +47007,10 @@
       </p:sp>
       <p:sp>
         <p:nvSpPr>
-          <p:cNvPr id="2" name="Date Placeholder 1">
-            <a:extLst>
-              <a:ext uri="{FF2B5EF4-FFF2-40B4-BE49-F238E27FC236}">
-                <a16:creationId xmlns:a16="http://schemas.microsoft.com/office/drawing/2014/main" id="{2ACC7CD0-CDEF-499B-929F-253562EB810A}"/>
+          <p:cNvPr id="4" name="Date Placeholder 3">
+            <a:extLst>
+              <a:ext uri="{FF2B5EF4-FFF2-40B4-BE49-F238E27FC236}">
+                <a16:creationId xmlns:a16="http://schemas.microsoft.com/office/drawing/2014/main" id="{0BA396AE-BE46-43FB-B4E7-224D2AF39F83}"/>
               </a:ext>
             </a:extLst>
           </p:cNvPr>
@@ -46041,7 +47036,7 @@
     </p:spTree>
     <p:extLst>
       <p:ext uri="{BB962C8B-B14F-4D97-AF65-F5344CB8AC3E}">
-        <p14:creationId xmlns:p14="http://schemas.microsoft.com/office/powerpoint/2010/main" val="202239174"/>
+        <p14:creationId xmlns:p14="http://schemas.microsoft.com/office/powerpoint/2010/main" val="3766803063"/>
       </p:ext>
     </p:extLst>
   </p:cSld>
@@ -46070,10 +47065,10 @@
       </p:grpSpPr>
       <p:pic>
         <p:nvPicPr>
-          <p:cNvPr id="9" name="Picture Placeholder 8" descr="Company logo">
-            <a:extLst>
-              <a:ext uri="{FF2B5EF4-FFF2-40B4-BE49-F238E27FC236}">
-                <a16:creationId xmlns:a16="http://schemas.microsoft.com/office/drawing/2014/main" id="{4826D6B4-2F2D-4028-9520-001218B5ECB2}"/>
+          <p:cNvPr id="10" name="Picture Placeholder 9" descr="Company logo">
+            <a:extLst>
+              <a:ext uri="{FF2B5EF4-FFF2-40B4-BE49-F238E27FC236}">
+                <a16:creationId xmlns:a16="http://schemas.microsoft.com/office/drawing/2014/main" id="{CA87F037-7DB2-45C9-A176-874E6A13B3A8}"/>
               </a:ext>
             </a:extLst>
           </p:cNvPr>
@@ -46102,40 +47097,12 @@
         </p:blipFill>
         <p:spPr/>
       </p:pic>
-      <p:sp>
-        <p:nvSpPr>
-          <p:cNvPr id="6" name="Title 5">
-            <a:extLst>
-              <a:ext uri="{FF2B5EF4-FFF2-40B4-BE49-F238E27FC236}">
-                <a16:creationId xmlns:a16="http://schemas.microsoft.com/office/drawing/2014/main" id="{DBCAB2DE-EF98-46F8-A621-2E1A6624F138}"/>
-              </a:ext>
-            </a:extLst>
-          </p:cNvPr>
-          <p:cNvSpPr>
-            <a:spLocks noGrp="1"/>
-          </p:cNvSpPr>
-          <p:nvPr>
-            <p:ph type="title"/>
-          </p:nvPr>
-        </p:nvSpPr>
-        <p:spPr/>
-        <p:txBody>
-          <a:bodyPr/>
-          <a:lstStyle/>
-          <a:p>
-            <a:r>
-              <a:rPr lang="en-US" dirty="0"/>
-              <a:t>Q &amp; A</a:t>
-            </a:r>
-          </a:p>
-        </p:txBody>
-      </p:sp>
       <p:pic>
         <p:nvPicPr>
-          <p:cNvPr id="11" name="Picture Placeholder 10" descr="Abstract background">
-            <a:extLst>
-              <a:ext uri="{FF2B5EF4-FFF2-40B4-BE49-F238E27FC236}">
-                <a16:creationId xmlns:a16="http://schemas.microsoft.com/office/drawing/2014/main" id="{FBF9093D-0565-48ED-AA9F-AE0E34947179}"/>
+          <p:cNvPr id="20" name="Picture Placeholder 19" descr="Abstract background">
+            <a:extLst>
+              <a:ext uri="{FF2B5EF4-FFF2-40B4-BE49-F238E27FC236}">
+                <a16:creationId xmlns:a16="http://schemas.microsoft.com/office/drawing/2014/main" id="{B9CF847D-0BA8-4D40-B95D-DAC8A415A56D}"/>
               </a:ext>
             </a:extLst>
           </p:cNvPr>
@@ -46143,7 +47110,7 @@
             <a:picLocks noGrp="1" noChangeAspect="1"/>
           </p:cNvPicPr>
           <p:nvPr>
-            <p:ph type="pic" sz="quarter" idx="14"/>
+            <p:ph type="pic" sz="quarter" idx="15"/>
           </p:nvPr>
         </p:nvPicPr>
         <p:blipFill>
@@ -46163,10 +47130,96 @@
       </p:pic>
       <p:sp>
         <p:nvSpPr>
-          <p:cNvPr id="5" name="Slide Number Placeholder 4">
-            <a:extLst>
-              <a:ext uri="{FF2B5EF4-FFF2-40B4-BE49-F238E27FC236}">
-                <a16:creationId xmlns:a16="http://schemas.microsoft.com/office/drawing/2014/main" id="{5C57986C-983F-481D-81FB-E03E9127DF12}"/>
+          <p:cNvPr id="5" name="Title 4">
+            <a:extLst>
+              <a:ext uri="{FF2B5EF4-FFF2-40B4-BE49-F238E27FC236}">
+                <a16:creationId xmlns:a16="http://schemas.microsoft.com/office/drawing/2014/main" id="{953F70E9-6111-446A-BD49-B6A996FA030D}"/>
+              </a:ext>
+            </a:extLst>
+          </p:cNvPr>
+          <p:cNvSpPr>
+            <a:spLocks noGrp="1"/>
+          </p:cNvSpPr>
+          <p:nvPr>
+            <p:ph type="title"/>
+          </p:nvPr>
+        </p:nvSpPr>
+        <p:spPr/>
+        <p:txBody>
+          <a:bodyPr/>
+          <a:lstStyle/>
+          <a:p>
+            <a:r>
+              <a:rPr lang="en-US" dirty="0"/>
+              <a:t>SPRINT2</a:t>
+            </a:r>
+          </a:p>
+        </p:txBody>
+      </p:sp>
+      <p:sp>
+        <p:nvSpPr>
+          <p:cNvPr id="8" name="Text Placeholder 7">
+            <a:extLst>
+              <a:ext uri="{FF2B5EF4-FFF2-40B4-BE49-F238E27FC236}">
+                <a16:creationId xmlns:a16="http://schemas.microsoft.com/office/drawing/2014/main" id="{7F9E6494-1485-4A3D-8CD3-31B5FAC16899}"/>
+              </a:ext>
+            </a:extLst>
+          </p:cNvPr>
+          <p:cNvSpPr>
+            <a:spLocks noGrp="1"/>
+          </p:cNvSpPr>
+          <p:nvPr>
+            <p:ph type="body" idx="14"/>
+          </p:nvPr>
+        </p:nvSpPr>
+        <p:spPr>
+          <a:xfrm>
+            <a:off x="6983368" y="2830849"/>
+            <a:ext cx="4482996" cy="2432603"/>
+          </a:xfrm>
+        </p:spPr>
+        <p:txBody>
+          <a:bodyPr/>
+          <a:lstStyle/>
+          <a:p>
+            <a:r>
+              <a:rPr lang="en-US" dirty="0" err="1"/>
+              <a:t>Websocket</a:t>
+            </a:r>
+            <a:endParaRPr lang="en-US" dirty="0"/>
+          </a:p>
+          <a:p>
+            <a:r>
+              <a:rPr lang="en-US" dirty="0"/>
+              <a:t>Synchronize the music</a:t>
+            </a:r>
+          </a:p>
+          <a:p>
+            <a:r>
+              <a:rPr lang="en-US" dirty="0"/>
+              <a:t>Chat</a:t>
+            </a:r>
+          </a:p>
+          <a:p>
+            <a:r>
+              <a:rPr lang="en-US" dirty="0"/>
+              <a:t>Close the studio</a:t>
+            </a:r>
+          </a:p>
+          <a:p>
+            <a:r>
+              <a:rPr lang="en-US" dirty="0"/>
+              <a:t>……..</a:t>
+            </a:r>
+          </a:p>
+        </p:txBody>
+      </p:sp>
+      <p:sp>
+        <p:nvSpPr>
+          <p:cNvPr id="4" name="Slide Number Placeholder 3">
+            <a:extLst>
+              <a:ext uri="{FF2B5EF4-FFF2-40B4-BE49-F238E27FC236}">
+                <a16:creationId xmlns:a16="http://schemas.microsoft.com/office/drawing/2014/main" id="{F9EB9F42-DBAC-4200-A2A6-96F4D943EB76}"/>
               </a:ext>
             </a:extLst>
           </p:cNvPr>
@@ -46184,6 +47237,7 @@
           <a:p>
             <a:fld id="{8D581BC7-E183-40DB-AC97-C19EA4EB8894}" type="slidenum">
               <a:rPr lang="en-US" smtClean="0"/>
+              <a:pPr/>
               <a:t>8</a:t>
             </a:fld>
             <a:endParaRPr lang="en-US" dirty="0"/>
@@ -46192,10 +47246,10 @@
       </p:sp>
       <p:sp>
         <p:nvSpPr>
-          <p:cNvPr id="3" name="Date Placeholder 2">
-            <a:extLst>
-              <a:ext uri="{FF2B5EF4-FFF2-40B4-BE49-F238E27FC236}">
-                <a16:creationId xmlns:a16="http://schemas.microsoft.com/office/drawing/2014/main" id="{28C55721-47F2-4ED5-B964-D4332938AD7F}"/>
+          <p:cNvPr id="2" name="Date Placeholder 1">
+            <a:extLst>
+              <a:ext uri="{FF2B5EF4-FFF2-40B4-BE49-F238E27FC236}">
+                <a16:creationId xmlns:a16="http://schemas.microsoft.com/office/drawing/2014/main" id="{2ACC7CD0-CDEF-499B-929F-253562EB810A}"/>
               </a:ext>
             </a:extLst>
           </p:cNvPr>
@@ -46221,7 +47275,7 @@
     </p:spTree>
     <p:extLst>
       <p:ext uri="{BB962C8B-B14F-4D97-AF65-F5344CB8AC3E}">
-        <p14:creationId xmlns:p14="http://schemas.microsoft.com/office/powerpoint/2010/main" val="689311810"/>
+        <p14:creationId xmlns:p14="http://schemas.microsoft.com/office/powerpoint/2010/main" val="202239174"/>
       </p:ext>
     </p:extLst>
   </p:cSld>
@@ -46253,7 +47307,7 @@
           <p:cNvPr id="6" name="Title 5">
             <a:extLst>
               <a:ext uri="{FF2B5EF4-FFF2-40B4-BE49-F238E27FC236}">
-                <a16:creationId xmlns:a16="http://schemas.microsoft.com/office/drawing/2014/main" id="{D2F9A33A-E955-4DFB-9469-3FDBA6703985}"/>
+                <a16:creationId xmlns:a16="http://schemas.microsoft.com/office/drawing/2014/main" id="{DBCAB2DE-EF98-46F8-A621-2E1A6624F138}"/>
               </a:ext>
             </a:extLst>
           </p:cNvPr>
@@ -46271,18 +47325,17 @@
           <a:p>
             <a:r>
               <a:rPr lang="en-US" dirty="0"/>
-              <a:t>THANK YOU!</a:t>
+              <a:t>Q &amp; A</a:t>
             </a:r>
-            <a:endParaRPr lang="ru-RU" dirty="0"/>
           </a:p>
         </p:txBody>
       </p:sp>
       <p:pic>
         <p:nvPicPr>
-          <p:cNvPr id="15" name="Picture Placeholder 14" descr="Abstract background">
-            <a:extLst>
-              <a:ext uri="{FF2B5EF4-FFF2-40B4-BE49-F238E27FC236}">
-                <a16:creationId xmlns:a16="http://schemas.microsoft.com/office/drawing/2014/main" id="{72AD0CC3-F8DE-4C10-916A-24BC65B1D283}"/>
+          <p:cNvPr id="11" name="Picture Placeholder 10" descr="Abstract background">
+            <a:extLst>
+              <a:ext uri="{FF2B5EF4-FFF2-40B4-BE49-F238E27FC236}">
+                <a16:creationId xmlns:a16="http://schemas.microsoft.com/office/drawing/2014/main" id="{FBF9093D-0565-48ED-AA9F-AE0E34947179}"/>
               </a:ext>
             </a:extLst>
           </p:cNvPr>
@@ -46290,7 +47343,7 @@
             <a:picLocks noGrp="1" noChangeAspect="1"/>
           </p:cNvPicPr>
           <p:nvPr>
-            <p:ph type="pic" sz="quarter" idx="22"/>
+            <p:ph type="pic" sz="quarter" idx="14"/>
           </p:nvPr>
         </p:nvPicPr>
         <p:blipFill>
@@ -46308,10 +47361,67 @@
         </p:blipFill>
         <p:spPr/>
       </p:pic>
+      <p:sp>
+        <p:nvSpPr>
+          <p:cNvPr id="5" name="Slide Number Placeholder 4">
+            <a:extLst>
+              <a:ext uri="{FF2B5EF4-FFF2-40B4-BE49-F238E27FC236}">
+                <a16:creationId xmlns:a16="http://schemas.microsoft.com/office/drawing/2014/main" id="{5C57986C-983F-481D-81FB-E03E9127DF12}"/>
+              </a:ext>
+            </a:extLst>
+          </p:cNvPr>
+          <p:cNvSpPr>
+            <a:spLocks noGrp="1"/>
+          </p:cNvSpPr>
+          <p:nvPr>
+            <p:ph type="sldNum" sz="quarter" idx="12"/>
+          </p:nvPr>
+        </p:nvSpPr>
+        <p:spPr/>
+        <p:txBody>
+          <a:bodyPr/>
+          <a:lstStyle/>
+          <a:p>
+            <a:fld id="{8D581BC7-E183-40DB-AC97-C19EA4EB8894}" type="slidenum">
+              <a:rPr lang="en-US" smtClean="0"/>
+              <a:t>9</a:t>
+            </a:fld>
+            <a:endParaRPr lang="en-US" dirty="0"/>
+          </a:p>
+        </p:txBody>
+      </p:sp>
+      <p:sp>
+        <p:nvSpPr>
+          <p:cNvPr id="3" name="Date Placeholder 2">
+            <a:extLst>
+              <a:ext uri="{FF2B5EF4-FFF2-40B4-BE49-F238E27FC236}">
+                <a16:creationId xmlns:a16="http://schemas.microsoft.com/office/drawing/2014/main" id="{28C55721-47F2-4ED5-B964-D4332938AD7F}"/>
+              </a:ext>
+            </a:extLst>
+          </p:cNvPr>
+          <p:cNvSpPr>
+            <a:spLocks noGrp="1"/>
+          </p:cNvSpPr>
+          <p:nvPr>
+            <p:ph type="dt" sz="half" idx="10"/>
+          </p:nvPr>
+        </p:nvSpPr>
+        <p:spPr/>
+        <p:txBody>
+          <a:bodyPr/>
+          <a:lstStyle/>
+          <a:p>
+            <a:r>
+              <a:rPr lang="en-US" dirty="0"/>
+              <a:t>MM.DD.20XX</a:t>
+            </a:r>
+          </a:p>
+        </p:txBody>
+      </p:sp>
     </p:spTree>
     <p:extLst>
       <p:ext uri="{BB962C8B-B14F-4D97-AF65-F5344CB8AC3E}">
-        <p14:creationId xmlns:p14="http://schemas.microsoft.com/office/powerpoint/2010/main" val="2695672276"/>
+        <p14:creationId xmlns:p14="http://schemas.microsoft.com/office/powerpoint/2010/main" val="689311810"/>
       </p:ext>
     </p:extLst>
   </p:cSld>
@@ -47151,6 +48261,23 @@
 </file>
 
 <file path=customXml/item1.xml><?xml version="1.0" encoding="utf-8"?>
+<p:properties xmlns:p="http://schemas.microsoft.com/office/2006/metadata/properties" xmlns:xsi="http://www.w3.org/2001/XMLSchema-instance" xmlns:pc="http://schemas.microsoft.com/office/infopath/2007/PartnerControls">
+  <documentManagement>
+    <MediaServiceKeyPoints xmlns="71af3243-3dd4-4a8d-8c0d-dd76da1f02a5" xsi:nil="true"/>
+  </documentManagement>
+</p:properties>
+</file>
+
+<file path=customXml/item2.xml><?xml version="1.0" encoding="utf-8"?>
+<?mso-contentType ?>
+<FormTemplates xmlns="http://schemas.microsoft.com/sharepoint/v3/contenttype/forms">
+  <Display>DocumentLibraryForm</Display>
+  <Edit>DocumentLibraryForm</Edit>
+  <New>DocumentLibraryForm</New>
+</FormTemplates>
+</file>
+
+<file path=customXml/item3.xml><?xml version="1.0" encoding="utf-8"?>
 <ct:contentTypeSchema xmlns:ct="http://schemas.microsoft.com/office/2006/metadata/contentType" xmlns:ma="http://schemas.microsoft.com/office/2006/metadata/properties/metaAttributes" ct:_="" ma:_="" ma:contentTypeName="Document" ma:contentTypeID="0x01010079F111ED35F8CC479449609E8A0923A6" ma:contentTypeVersion="11" ma:contentTypeDescription="Create a new document." ma:contentTypeScope="" ma:versionID="96291512c1ee715ab617f4c07df79fc1">
   <xsd:schema xmlns:xsd="http://www.w3.org/2001/XMLSchema" xmlns:xs="http://www.w3.org/2001/XMLSchema" xmlns:p="http://schemas.microsoft.com/office/2006/metadata/properties" xmlns:ns2="71af3243-3dd4-4a8d-8c0d-dd76da1f02a5" xmlns:ns3="16c05727-aa75-4e4a-9b5f-8a80a1165891" targetNamespace="http://schemas.microsoft.com/office/2006/metadata/properties" ma:root="true" ma:fieldsID="8256c27c40ca5c40ce1cf6c44f0205df" ns2:_="" ns3:_="">
     <xsd:import namespace="71af3243-3dd4-4a8d-8c0d-dd76da1f02a5"/>
@@ -47361,24 +48488,25 @@
 </ct:contentTypeSchema>
 </file>
 
-<file path=customXml/item2.xml><?xml version="1.0" encoding="utf-8"?>
-<?mso-contentType ?>
-<FormTemplates xmlns="http://schemas.microsoft.com/sharepoint/v3/contenttype/forms">
-  <Display>DocumentLibraryForm</Display>
-  <Edit>DocumentLibraryForm</Edit>
-  <New>DocumentLibraryForm</New>
-</FormTemplates>
+<file path=customXml/itemProps1.xml><?xml version="1.0" encoding="utf-8"?>
+<ds:datastoreItem xmlns:ds="http://schemas.openxmlformats.org/officeDocument/2006/customXml" ds:itemID="{D726A944-A9F4-4295-9B5E-C397EB1318B9}">
+  <ds:schemaRefs>
+    <ds:schemaRef ds:uri="http://schemas.microsoft.com/office/2006/metadata/properties"/>
+    <ds:schemaRef ds:uri="http://schemas.microsoft.com/office/infopath/2007/PartnerControls"/>
+    <ds:schemaRef ds:uri="71af3243-3dd4-4a8d-8c0d-dd76da1f02a5"/>
+  </ds:schemaRefs>
+</ds:datastoreItem>
 </file>
 
-<file path=customXml/item3.xml><?xml version="1.0" encoding="utf-8"?>
-<p:properties xmlns:p="http://schemas.microsoft.com/office/2006/metadata/properties" xmlns:xsi="http://www.w3.org/2001/XMLSchema-instance" xmlns:pc="http://schemas.microsoft.com/office/infopath/2007/PartnerControls">
-  <documentManagement>
-    <MediaServiceKeyPoints xmlns="71af3243-3dd4-4a8d-8c0d-dd76da1f02a5" xsi:nil="true"/>
-  </documentManagement>
-</p:properties>
+<file path=customXml/itemProps2.xml><?xml version="1.0" encoding="utf-8"?>
+<ds:datastoreItem xmlns:ds="http://schemas.openxmlformats.org/officeDocument/2006/customXml" ds:itemID="{01743C61-8CA7-48FF-B2A3-6055DA854CF6}">
+  <ds:schemaRefs>
+    <ds:schemaRef ds:uri="http://schemas.microsoft.com/sharepoint/v3/contenttype/forms"/>
+  </ds:schemaRefs>
+</ds:datastoreItem>
 </file>
 
-<file path=customXml/itemProps1.xml><?xml version="1.0" encoding="utf-8"?>
+<file path=customXml/itemProps3.xml><?xml version="1.0" encoding="utf-8"?>
 <ds:datastoreItem xmlns:ds="http://schemas.openxmlformats.org/officeDocument/2006/customXml" ds:itemID="{472965D8-9C19-4E48-8421-5D6B21FC440C}">
   <ds:schemaRefs>
     <ds:schemaRef ds:uri="http://schemas.microsoft.com/office/2006/metadata/contentType"/>
@@ -47395,22 +48523,4 @@
     <ds:schemaRef ds:uri="http://schemas.microsoft.com/internal/obd"/>
   </ds:schemaRefs>
 </ds:datastoreItem>
-</file>
-
-<file path=customXml/itemProps2.xml><?xml version="1.0" encoding="utf-8"?>
-<ds:datastoreItem xmlns:ds="http://schemas.openxmlformats.org/officeDocument/2006/customXml" ds:itemID="{01743C61-8CA7-48FF-B2A3-6055DA854CF6}">
-  <ds:schemaRefs>
-    <ds:schemaRef ds:uri="http://schemas.microsoft.com/sharepoint/v3/contenttype/forms"/>
-  </ds:schemaRefs>
-</ds:datastoreItem>
-</file>
-
-<file path=customXml/itemProps3.xml><?xml version="1.0" encoding="utf-8"?>
-<ds:datastoreItem xmlns:ds="http://schemas.openxmlformats.org/officeDocument/2006/customXml" ds:itemID="{D726A944-A9F4-4295-9B5E-C397EB1318B9}">
-  <ds:schemaRefs>
-    <ds:schemaRef ds:uri="http://schemas.microsoft.com/office/2006/metadata/properties"/>
-    <ds:schemaRef ds:uri="http://schemas.microsoft.com/office/infopath/2007/PartnerControls"/>
-    <ds:schemaRef ds:uri="71af3243-3dd4-4a8d-8c0d-dd76da1f02a5"/>
-  </ds:schemaRefs>
-</ds:datastoreItem>
 </file>
</xml_diff>

<commit_message>
Revised slides, PLEASE GRADE SLIDES BASED ON PREVIOUS VERSION
</commit_message>
<xml_diff>
--- a/SYNPHONY.pptx
+++ b/SYNPHONY.pptx
@@ -44408,34 +44408,6 @@
           </a:p>
         </p:txBody>
       </p:sp>
-      <p:sp>
-        <p:nvSpPr>
-          <p:cNvPr id="6" name="Date Placeholder 5">
-            <a:extLst>
-              <a:ext uri="{FF2B5EF4-FFF2-40B4-BE49-F238E27FC236}">
-                <a16:creationId xmlns:a16="http://schemas.microsoft.com/office/drawing/2014/main" id="{5EC88EDC-DE1B-4E22-AB2A-B461D5C81354}"/>
-              </a:ext>
-            </a:extLst>
-          </p:cNvPr>
-          <p:cNvSpPr>
-            <a:spLocks noGrp="1"/>
-          </p:cNvSpPr>
-          <p:nvPr>
-            <p:ph type="dt" sz="half" idx="10"/>
-          </p:nvPr>
-        </p:nvSpPr>
-        <p:spPr/>
-        <p:txBody>
-          <a:bodyPr/>
-          <a:lstStyle/>
-          <a:p>
-            <a:r>
-              <a:rPr lang="en-US" dirty="0"/>
-              <a:t>MM.DD.20XX</a:t>
-            </a:r>
-          </a:p>
-        </p:txBody>
-      </p:sp>
     </p:spTree>
     <p:extLst>
       <p:ext uri="{BB962C8B-B14F-4D97-AF65-F5344CB8AC3E}">
@@ -44842,34 +44814,6 @@
           </a:p>
         </p:txBody>
       </p:sp>
-      <p:sp>
-        <p:nvSpPr>
-          <p:cNvPr id="2" name="Date Placeholder 1">
-            <a:extLst>
-              <a:ext uri="{FF2B5EF4-FFF2-40B4-BE49-F238E27FC236}">
-                <a16:creationId xmlns:a16="http://schemas.microsoft.com/office/drawing/2014/main" id="{AC3AE2A4-3957-4B28-BF08-92D47AFB3D61}"/>
-              </a:ext>
-            </a:extLst>
-          </p:cNvPr>
-          <p:cNvSpPr>
-            <a:spLocks noGrp="1"/>
-          </p:cNvSpPr>
-          <p:nvPr>
-            <p:ph type="dt" sz="half" idx="10"/>
-          </p:nvPr>
-        </p:nvSpPr>
-        <p:spPr/>
-        <p:txBody>
-          <a:bodyPr/>
-          <a:lstStyle/>
-          <a:p>
-            <a:r>
-              <a:rPr lang="en-US" dirty="0"/>
-              <a:t>MM.DD.20XX</a:t>
-            </a:r>
-          </a:p>
-        </p:txBody>
-      </p:sp>
     </p:spTree>
     <p:extLst>
       <p:ext uri="{BB962C8B-B14F-4D97-AF65-F5344CB8AC3E}">
@@ -45438,34 +45382,6 @@
       </p:sp>
       <p:sp>
         <p:nvSpPr>
-          <p:cNvPr id="2" name="Date Placeholder 1">
-            <a:extLst>
-              <a:ext uri="{FF2B5EF4-FFF2-40B4-BE49-F238E27FC236}">
-                <a16:creationId xmlns:a16="http://schemas.microsoft.com/office/drawing/2014/main" id="{8B2EEAA2-E066-4E86-A51B-FAC3333192BD}"/>
-              </a:ext>
-            </a:extLst>
-          </p:cNvPr>
-          <p:cNvSpPr>
-            <a:spLocks noGrp="1"/>
-          </p:cNvSpPr>
-          <p:nvPr>
-            <p:ph type="dt" sz="half" idx="10"/>
-          </p:nvPr>
-        </p:nvSpPr>
-        <p:spPr/>
-        <p:txBody>
-          <a:bodyPr/>
-          <a:lstStyle/>
-          <a:p>
-            <a:r>
-              <a:rPr lang="en-US" dirty="0"/>
-              <a:t>MM.DD.20XX</a:t>
-            </a:r>
-          </a:p>
-        </p:txBody>
-      </p:sp>
-      <p:sp>
-        <p:nvSpPr>
           <p:cNvPr id="20" name="Text Placeholder 15">
             <a:extLst>
               <a:ext uri="{FF2B5EF4-FFF2-40B4-BE49-F238E27FC236}">
@@ -46761,34 +46677,6 @@
           </a:p>
         </p:txBody>
       </p:sp>
-      <p:sp>
-        <p:nvSpPr>
-          <p:cNvPr id="4" name="Date Placeholder 3">
-            <a:extLst>
-              <a:ext uri="{FF2B5EF4-FFF2-40B4-BE49-F238E27FC236}">
-                <a16:creationId xmlns:a16="http://schemas.microsoft.com/office/drawing/2014/main" id="{0BA396AE-BE46-43FB-B4E7-224D2AF39F83}"/>
-              </a:ext>
-            </a:extLst>
-          </p:cNvPr>
-          <p:cNvSpPr>
-            <a:spLocks noGrp="1"/>
-          </p:cNvSpPr>
-          <p:nvPr>
-            <p:ph type="dt" sz="half" idx="10"/>
-          </p:nvPr>
-        </p:nvSpPr>
-        <p:spPr/>
-        <p:txBody>
-          <a:bodyPr/>
-          <a:lstStyle/>
-          <a:p>
-            <a:r>
-              <a:rPr lang="en-US" dirty="0"/>
-              <a:t>MM.DD.20XX</a:t>
-            </a:r>
-          </a:p>
-        </p:txBody>
-      </p:sp>
     </p:spTree>
     <p:extLst>
       <p:ext uri="{BB962C8B-B14F-4D97-AF65-F5344CB8AC3E}">
@@ -47002,34 +46890,6 @@
               <a:t>7</a:t>
             </a:fld>
             <a:endParaRPr lang="en-US" dirty="0"/>
-          </a:p>
-        </p:txBody>
-      </p:sp>
-      <p:sp>
-        <p:nvSpPr>
-          <p:cNvPr id="4" name="Date Placeholder 3">
-            <a:extLst>
-              <a:ext uri="{FF2B5EF4-FFF2-40B4-BE49-F238E27FC236}">
-                <a16:creationId xmlns:a16="http://schemas.microsoft.com/office/drawing/2014/main" id="{0BA396AE-BE46-43FB-B4E7-224D2AF39F83}"/>
-              </a:ext>
-            </a:extLst>
-          </p:cNvPr>
-          <p:cNvSpPr>
-            <a:spLocks noGrp="1"/>
-          </p:cNvSpPr>
-          <p:nvPr>
-            <p:ph type="dt" sz="half" idx="10"/>
-          </p:nvPr>
-        </p:nvSpPr>
-        <p:spPr/>
-        <p:txBody>
-          <a:bodyPr/>
-          <a:lstStyle/>
-          <a:p>
-            <a:r>
-              <a:rPr lang="en-US" dirty="0"/>
-              <a:t>MM.DD.20XX</a:t>
-            </a:r>
           </a:p>
         </p:txBody>
       </p:sp>
@@ -47244,34 +47104,6 @@
           </a:p>
         </p:txBody>
       </p:sp>
-      <p:sp>
-        <p:nvSpPr>
-          <p:cNvPr id="2" name="Date Placeholder 1">
-            <a:extLst>
-              <a:ext uri="{FF2B5EF4-FFF2-40B4-BE49-F238E27FC236}">
-                <a16:creationId xmlns:a16="http://schemas.microsoft.com/office/drawing/2014/main" id="{2ACC7CD0-CDEF-499B-929F-253562EB810A}"/>
-              </a:ext>
-            </a:extLst>
-          </p:cNvPr>
-          <p:cNvSpPr>
-            <a:spLocks noGrp="1"/>
-          </p:cNvSpPr>
-          <p:nvPr>
-            <p:ph type="dt" sz="half" idx="10"/>
-          </p:nvPr>
-        </p:nvSpPr>
-        <p:spPr/>
-        <p:txBody>
-          <a:bodyPr/>
-          <a:lstStyle/>
-          <a:p>
-            <a:r>
-              <a:rPr lang="en-US" dirty="0"/>
-              <a:t>MM.DD.20XX</a:t>
-            </a:r>
-          </a:p>
-        </p:txBody>
-      </p:sp>
     </p:spTree>
     <p:extLst>
       <p:ext uri="{BB962C8B-B14F-4D97-AF65-F5344CB8AC3E}">
@@ -47387,34 +47219,6 @@
               <a:t>9</a:t>
             </a:fld>
             <a:endParaRPr lang="en-US" dirty="0"/>
-          </a:p>
-        </p:txBody>
-      </p:sp>
-      <p:sp>
-        <p:nvSpPr>
-          <p:cNvPr id="3" name="Date Placeholder 2">
-            <a:extLst>
-              <a:ext uri="{FF2B5EF4-FFF2-40B4-BE49-F238E27FC236}">
-                <a16:creationId xmlns:a16="http://schemas.microsoft.com/office/drawing/2014/main" id="{28C55721-47F2-4ED5-B964-D4332938AD7F}"/>
-              </a:ext>
-            </a:extLst>
-          </p:cNvPr>
-          <p:cNvSpPr>
-            <a:spLocks noGrp="1"/>
-          </p:cNvSpPr>
-          <p:nvPr>
-            <p:ph type="dt" sz="half" idx="10"/>
-          </p:nvPr>
-        </p:nvSpPr>
-        <p:spPr/>
-        <p:txBody>
-          <a:bodyPr/>
-          <a:lstStyle/>
-          <a:p>
-            <a:r>
-              <a:rPr lang="en-US" dirty="0"/>
-              <a:t>MM.DD.20XX</a:t>
-            </a:r>
           </a:p>
         </p:txBody>
       </p:sp>
@@ -48261,23 +48065,6 @@
 </file>
 
 <file path=customXml/item1.xml><?xml version="1.0" encoding="utf-8"?>
-<p:properties xmlns:p="http://schemas.microsoft.com/office/2006/metadata/properties" xmlns:xsi="http://www.w3.org/2001/XMLSchema-instance" xmlns:pc="http://schemas.microsoft.com/office/infopath/2007/PartnerControls">
-  <documentManagement>
-    <MediaServiceKeyPoints xmlns="71af3243-3dd4-4a8d-8c0d-dd76da1f02a5" xsi:nil="true"/>
-  </documentManagement>
-</p:properties>
-</file>
-
-<file path=customXml/item2.xml><?xml version="1.0" encoding="utf-8"?>
-<?mso-contentType ?>
-<FormTemplates xmlns="http://schemas.microsoft.com/sharepoint/v3/contenttype/forms">
-  <Display>DocumentLibraryForm</Display>
-  <Edit>DocumentLibraryForm</Edit>
-  <New>DocumentLibraryForm</New>
-</FormTemplates>
-</file>
-
-<file path=customXml/item3.xml><?xml version="1.0" encoding="utf-8"?>
 <ct:contentTypeSchema xmlns:ct="http://schemas.microsoft.com/office/2006/metadata/contentType" xmlns:ma="http://schemas.microsoft.com/office/2006/metadata/properties/metaAttributes" ct:_="" ma:_="" ma:contentTypeName="Document" ma:contentTypeID="0x01010079F111ED35F8CC479449609E8A0923A6" ma:contentTypeVersion="11" ma:contentTypeDescription="Create a new document." ma:contentTypeScope="" ma:versionID="96291512c1ee715ab617f4c07df79fc1">
   <xsd:schema xmlns:xsd="http://www.w3.org/2001/XMLSchema" xmlns:xs="http://www.w3.org/2001/XMLSchema" xmlns:p="http://schemas.microsoft.com/office/2006/metadata/properties" xmlns:ns2="71af3243-3dd4-4a8d-8c0d-dd76da1f02a5" xmlns:ns3="16c05727-aa75-4e4a-9b5f-8a80a1165891" targetNamespace="http://schemas.microsoft.com/office/2006/metadata/properties" ma:root="true" ma:fieldsID="8256c27c40ca5c40ce1cf6c44f0205df" ns2:_="" ns3:_="">
     <xsd:import namespace="71af3243-3dd4-4a8d-8c0d-dd76da1f02a5"/>
@@ -48488,25 +48275,24 @@
 </ct:contentTypeSchema>
 </file>
 
-<file path=customXml/itemProps1.xml><?xml version="1.0" encoding="utf-8"?>
-<ds:datastoreItem xmlns:ds="http://schemas.openxmlformats.org/officeDocument/2006/customXml" ds:itemID="{D726A944-A9F4-4295-9B5E-C397EB1318B9}">
-  <ds:schemaRefs>
-    <ds:schemaRef ds:uri="http://schemas.microsoft.com/office/2006/metadata/properties"/>
-    <ds:schemaRef ds:uri="http://schemas.microsoft.com/office/infopath/2007/PartnerControls"/>
-    <ds:schemaRef ds:uri="71af3243-3dd4-4a8d-8c0d-dd76da1f02a5"/>
-  </ds:schemaRefs>
-</ds:datastoreItem>
+<file path=customXml/item2.xml><?xml version="1.0" encoding="utf-8"?>
+<?mso-contentType ?>
+<FormTemplates xmlns="http://schemas.microsoft.com/sharepoint/v3/contenttype/forms">
+  <Display>DocumentLibraryForm</Display>
+  <Edit>DocumentLibraryForm</Edit>
+  <New>DocumentLibraryForm</New>
+</FormTemplates>
 </file>
 
-<file path=customXml/itemProps2.xml><?xml version="1.0" encoding="utf-8"?>
-<ds:datastoreItem xmlns:ds="http://schemas.openxmlformats.org/officeDocument/2006/customXml" ds:itemID="{01743C61-8CA7-48FF-B2A3-6055DA854CF6}">
-  <ds:schemaRefs>
-    <ds:schemaRef ds:uri="http://schemas.microsoft.com/sharepoint/v3/contenttype/forms"/>
-  </ds:schemaRefs>
-</ds:datastoreItem>
+<file path=customXml/item3.xml><?xml version="1.0" encoding="utf-8"?>
+<p:properties xmlns:p="http://schemas.microsoft.com/office/2006/metadata/properties" xmlns:xsi="http://www.w3.org/2001/XMLSchema-instance" xmlns:pc="http://schemas.microsoft.com/office/infopath/2007/PartnerControls">
+  <documentManagement>
+    <MediaServiceKeyPoints xmlns="71af3243-3dd4-4a8d-8c0d-dd76da1f02a5" xsi:nil="true"/>
+  </documentManagement>
+</p:properties>
 </file>
 
-<file path=customXml/itemProps3.xml><?xml version="1.0" encoding="utf-8"?>
+<file path=customXml/itemProps1.xml><?xml version="1.0" encoding="utf-8"?>
 <ds:datastoreItem xmlns:ds="http://schemas.openxmlformats.org/officeDocument/2006/customXml" ds:itemID="{472965D8-9C19-4E48-8421-5D6B21FC440C}">
   <ds:schemaRefs>
     <ds:schemaRef ds:uri="http://schemas.microsoft.com/office/2006/metadata/contentType"/>
@@ -48523,4 +48309,22 @@
     <ds:schemaRef ds:uri="http://schemas.microsoft.com/internal/obd"/>
   </ds:schemaRefs>
 </ds:datastoreItem>
+</file>
+
+<file path=customXml/itemProps2.xml><?xml version="1.0" encoding="utf-8"?>
+<ds:datastoreItem xmlns:ds="http://schemas.openxmlformats.org/officeDocument/2006/customXml" ds:itemID="{01743C61-8CA7-48FF-B2A3-6055DA854CF6}">
+  <ds:schemaRefs>
+    <ds:schemaRef ds:uri="http://schemas.microsoft.com/sharepoint/v3/contenttype/forms"/>
+  </ds:schemaRefs>
+</ds:datastoreItem>
+</file>
+
+<file path=customXml/itemProps3.xml><?xml version="1.0" encoding="utf-8"?>
+<ds:datastoreItem xmlns:ds="http://schemas.openxmlformats.org/officeDocument/2006/customXml" ds:itemID="{D726A944-A9F4-4295-9B5E-C397EB1318B9}">
+  <ds:schemaRefs>
+    <ds:schemaRef ds:uri="http://schemas.microsoft.com/office/2006/metadata/properties"/>
+    <ds:schemaRef ds:uri="http://schemas.microsoft.com/office/infopath/2007/PartnerControls"/>
+    <ds:schemaRef ds:uri="71af3243-3dd4-4a8d-8c0d-dd76da1f02a5"/>
+  </ds:schemaRefs>
+</ds:datastoreItem>
 </file>
</xml_diff>